<commit_message>
finished presentation and data
</commit_message>
<xml_diff>
--- a/presentations/Approximation_Presentation.pptx
+++ b/presentations/Approximation_Presentation.pptx
@@ -29,10 +29,11 @@
     <p:sldId id="284" r:id="rId23"/>
     <p:sldId id="286" r:id="rId24"/>
     <p:sldId id="287" r:id="rId25"/>
-    <p:sldId id="258" r:id="rId26"/>
-    <p:sldId id="259" r:id="rId27"/>
+    <p:sldId id="288" r:id="rId26"/>
+    <p:sldId id="258" r:id="rId27"/>
     <p:sldId id="260" r:id="rId28"/>
-    <p:sldId id="261" r:id="rId29"/>
+    <p:sldId id="259" r:id="rId29"/>
+    <p:sldId id="261" r:id="rId30"/>
   </p:sldIdLst>
   <p:sldSz cx="12192000" cy="6858000"/>
   <p:notesSz cx="6858000" cy="9144000"/>
@@ -861,7 +862,7 @@
           <a:p>
             <a:fld id="{C91E8445-3EF6-43C6-9C4D-636222202582}" type="datetimeFigureOut">
               <a:rPr lang="en-US" smtClean="0"/>
-              <a:t>4/28/2022</a:t>
+              <a:t>5/1/2022</a:t>
             </a:fld>
             <a:endParaRPr lang="en-US"/>
           </a:p>
@@ -1112,7 +1113,7 @@
           <a:p>
             <a:fld id="{C91E8445-3EF6-43C6-9C4D-636222202582}" type="datetimeFigureOut">
               <a:rPr lang="en-US" smtClean="0"/>
-              <a:t>4/28/2022</a:t>
+              <a:t>5/1/2022</a:t>
             </a:fld>
             <a:endParaRPr lang="en-US"/>
           </a:p>
@@ -1426,7 +1427,7 @@
           <a:p>
             <a:fld id="{C91E8445-3EF6-43C6-9C4D-636222202582}" type="datetimeFigureOut">
               <a:rPr lang="en-US" smtClean="0"/>
-              <a:t>4/28/2022</a:t>
+              <a:t>5/1/2022</a:t>
             </a:fld>
             <a:endParaRPr lang="en-US"/>
           </a:p>
@@ -1767,7 +1768,7 @@
           <a:p>
             <a:fld id="{C91E8445-3EF6-43C6-9C4D-636222202582}" type="datetimeFigureOut">
               <a:rPr lang="en-US" smtClean="0"/>
-              <a:t>4/28/2022</a:t>
+              <a:t>5/1/2022</a:t>
             </a:fld>
             <a:endParaRPr lang="en-US"/>
           </a:p>
@@ -2081,7 +2082,7 @@
           <a:p>
             <a:fld id="{C91E8445-3EF6-43C6-9C4D-636222202582}" type="datetimeFigureOut">
               <a:rPr lang="en-US" smtClean="0"/>
-              <a:t>4/28/2022</a:t>
+              <a:t>5/1/2022</a:t>
             </a:fld>
             <a:endParaRPr lang="en-US"/>
           </a:p>
@@ -2474,7 +2475,7 @@
           <a:p>
             <a:fld id="{C91E8445-3EF6-43C6-9C4D-636222202582}" type="datetimeFigureOut">
               <a:rPr lang="en-US" smtClean="0"/>
-              <a:t>4/28/2022</a:t>
+              <a:t>5/1/2022</a:t>
             </a:fld>
             <a:endParaRPr lang="en-US"/>
           </a:p>
@@ -2644,7 +2645,7 @@
           <a:p>
             <a:fld id="{C91E8445-3EF6-43C6-9C4D-636222202582}" type="datetimeFigureOut">
               <a:rPr lang="en-US" smtClean="0"/>
-              <a:t>4/28/2022</a:t>
+              <a:t>5/1/2022</a:t>
             </a:fld>
             <a:endParaRPr lang="en-US"/>
           </a:p>
@@ -2824,7 +2825,7 @@
           <a:p>
             <a:fld id="{C91E8445-3EF6-43C6-9C4D-636222202582}" type="datetimeFigureOut">
               <a:rPr lang="en-US" smtClean="0"/>
-              <a:t>4/28/2022</a:t>
+              <a:t>5/1/2022</a:t>
             </a:fld>
             <a:endParaRPr lang="en-US"/>
           </a:p>
@@ -3000,7 +3001,7 @@
           <a:p>
             <a:fld id="{C91E8445-3EF6-43C6-9C4D-636222202582}" type="datetimeFigureOut">
               <a:rPr lang="en-US" smtClean="0"/>
-              <a:t>4/28/2022</a:t>
+              <a:t>5/1/2022</a:t>
             </a:fld>
             <a:endParaRPr lang="en-US"/>
           </a:p>
@@ -3247,7 +3248,7 @@
           <a:p>
             <a:fld id="{C91E8445-3EF6-43C6-9C4D-636222202582}" type="datetimeFigureOut">
               <a:rPr lang="en-US" smtClean="0"/>
-              <a:t>4/28/2022</a:t>
+              <a:t>5/1/2022</a:t>
             </a:fld>
             <a:endParaRPr lang="en-US"/>
           </a:p>
@@ -3479,7 +3480,7 @@
           <a:p>
             <a:fld id="{C91E8445-3EF6-43C6-9C4D-636222202582}" type="datetimeFigureOut">
               <a:rPr lang="en-US" smtClean="0"/>
-              <a:t>4/28/2022</a:t>
+              <a:t>5/1/2022</a:t>
             </a:fld>
             <a:endParaRPr lang="en-US"/>
           </a:p>
@@ -3853,7 +3854,7 @@
           <a:p>
             <a:fld id="{C91E8445-3EF6-43C6-9C4D-636222202582}" type="datetimeFigureOut">
               <a:rPr lang="en-US" smtClean="0"/>
-              <a:t>4/28/2022</a:t>
+              <a:t>5/1/2022</a:t>
             </a:fld>
             <a:endParaRPr lang="en-US"/>
           </a:p>
@@ -3976,7 +3977,7 @@
           <a:p>
             <a:fld id="{C91E8445-3EF6-43C6-9C4D-636222202582}" type="datetimeFigureOut">
               <a:rPr lang="en-US" smtClean="0"/>
-              <a:t>4/28/2022</a:t>
+              <a:t>5/1/2022</a:t>
             </a:fld>
             <a:endParaRPr lang="en-US"/>
           </a:p>
@@ -4071,7 +4072,7 @@
           <a:p>
             <a:fld id="{C91E8445-3EF6-43C6-9C4D-636222202582}" type="datetimeFigureOut">
               <a:rPr lang="en-US" smtClean="0"/>
-              <a:t>4/28/2022</a:t>
+              <a:t>5/1/2022</a:t>
             </a:fld>
             <a:endParaRPr lang="en-US"/>
           </a:p>
@@ -4326,7 +4327,7 @@
           <a:p>
             <a:fld id="{C91E8445-3EF6-43C6-9C4D-636222202582}" type="datetimeFigureOut">
               <a:rPr lang="en-US" smtClean="0"/>
-              <a:t>4/28/2022</a:t>
+              <a:t>5/1/2022</a:t>
             </a:fld>
             <a:endParaRPr lang="en-US"/>
           </a:p>
@@ -4589,7 +4590,7 @@
           <a:p>
             <a:fld id="{C91E8445-3EF6-43C6-9C4D-636222202582}" type="datetimeFigureOut">
               <a:rPr lang="en-US" smtClean="0"/>
-              <a:t>4/28/2022</a:t>
+              <a:t>5/1/2022</a:t>
             </a:fld>
             <a:endParaRPr lang="en-US"/>
           </a:p>
@@ -5332,7 +5333,7 @@
           <a:p>
             <a:fld id="{C91E8445-3EF6-43C6-9C4D-636222202582}" type="datetimeFigureOut">
               <a:rPr lang="en-US" smtClean="0"/>
-              <a:t>4/28/2022</a:t>
+              <a:t>5/1/2022</a:t>
             </a:fld>
             <a:endParaRPr lang="en-US"/>
           </a:p>
@@ -5872,14 +5873,27 @@
             <p:ph type="ctrTitle"/>
           </p:nvPr>
         </p:nvSpPr>
-        <p:spPr/>
+        <p:spPr>
+          <a:xfrm>
+            <a:off x="-590090" y="1311965"/>
+            <a:ext cx="11423741" cy="2738868"/>
+          </a:xfrm>
+        </p:spPr>
         <p:txBody>
           <a:bodyPr/>
           <a:lstStyle/>
           <a:p>
+            <a:pPr algn="ctr"/>
             <a:r>
               <a:rPr lang="en-US" dirty="0"/>
-              <a:t>Approximation Presentation</a:t>
+              <a:t>Minimum Graph Coloring </a:t>
+            </a:r>
+            <a:br>
+              <a:rPr lang="en-US" dirty="0"/>
+            </a:br>
+            <a:r>
+              <a:rPr lang="en-US" dirty="0"/>
+              <a:t>Approximation</a:t>
             </a:r>
           </a:p>
         </p:txBody>
@@ -5905,10 +5919,10 @@
           <a:bodyPr/>
           <a:lstStyle/>
           <a:p>
-            <a:r>
-              <a:rPr lang="en-US"/>
-              <a:t>Corwin Willms</a:t>
-            </a:r>
+            <a:endParaRPr lang="en-US" dirty="0"/>
+          </a:p>
+          <a:p>
+            <a:endParaRPr lang="en-US" dirty="0"/>
           </a:p>
         </p:txBody>
       </p:sp>
@@ -20584,9 +20598,17 @@
                 <a:solidFill>
                   <a:srgbClr val="000000"/>
                 </a:solidFill>
+              </a:rPr>
+              <a:t>P</a:t>
+            </a:r>
+            <a:r>
+              <a:rPr lang="en-US" dirty="0">
+                <a:solidFill>
+                  <a:srgbClr val="000000"/>
+                </a:solidFill>
                 <a:effectLst/>
               </a:rPr>
-              <a:t>pseudocode for the approximation</a:t>
+              <a:t>seudocode For Our Approximation</a:t>
             </a:r>
             <a:endParaRPr lang="en-US" dirty="0"/>
           </a:p>
@@ -20594,38 +20616,261 @@
       </p:sp>
       <p:sp>
         <p:nvSpPr>
-          <p:cNvPr id="3" name="Content Placeholder 2">
+          <p:cNvPr id="4" name="TextBox 3">
             <a:extLst>
               <a:ext uri="{FF2B5EF4-FFF2-40B4-BE49-F238E27FC236}">
-                <a16:creationId xmlns:a16="http://schemas.microsoft.com/office/drawing/2014/main" id="{C20F5CFC-5AE1-4FA3-9428-7B2121B631DA}"/>
+                <a16:creationId xmlns:a16="http://schemas.microsoft.com/office/drawing/2014/main" id="{AC75F3F5-EFD9-43FC-9044-081A3D7604E1}"/>
               </a:ext>
             </a:extLst>
           </p:cNvPr>
-          <p:cNvSpPr>
-            <a:spLocks noGrp="1"/>
-          </p:cNvSpPr>
-          <p:nvPr>
-            <p:ph idx="1"/>
-          </p:nvPr>
+          <p:cNvSpPr txBox="1"/>
+          <p:nvPr/>
         </p:nvSpPr>
         <p:spPr>
           <a:xfrm>
-            <a:off x="677334" y="1321905"/>
-            <a:ext cx="7085127" cy="4669762"/>
+            <a:off x="940437" y="1234335"/>
+            <a:ext cx="9257111" cy="6617196"/>
           </a:xfrm>
+          <a:prstGeom prst="rect">
+            <a:avLst/>
+          </a:prstGeom>
+          <a:noFill/>
         </p:spPr>
         <p:txBody>
-          <a:bodyPr>
-            <a:noAutofit/>
+          <a:bodyPr wrap="square" rtlCol="0">
+            <a:spAutoFit/>
           </a:bodyPr>
           <a:lstStyle/>
           <a:p>
+            <a:pPr>
+              <a:lnSpc>
+                <a:spcPct val="150000"/>
+              </a:lnSpc>
+            </a:pPr>
+            <a:r>
+              <a:rPr lang="en-US" sz="1600" dirty="0" err="1"/>
+              <a:t>Approx_min_colors</a:t>
+            </a:r>
+            <a:r>
+              <a:rPr lang="en-US" sz="1600" dirty="0"/>
+              <a:t>(G, V):  </a:t>
+            </a:r>
+            <a:r>
+              <a:rPr lang="en-US" sz="1600" dirty="0">
+                <a:solidFill>
+                  <a:schemeClr val="accent1">
+                    <a:lumMod val="75000"/>
+                  </a:schemeClr>
+                </a:solidFill>
+              </a:rPr>
+              <a:t>// G is the graph, V is # of vertices</a:t>
+            </a:r>
+            <a:endParaRPr lang="en-US" sz="1600" dirty="0"/>
+          </a:p>
+          <a:p>
             <a:pPr marL="0" indent="0">
+              <a:lnSpc>
+                <a:spcPct val="150000"/>
+              </a:lnSpc>
               <a:buNone/>
             </a:pPr>
             <a:r>
               <a:rPr lang="en-US" sz="1600" dirty="0"/>
-              <a:t>Approx_min_colors(G, V):</a:t>
+              <a:t>	result[V] </a:t>
+            </a:r>
+            <a:r>
+              <a:rPr lang="en-US" sz="1600" dirty="0">
+                <a:solidFill>
+                  <a:schemeClr val="accent1">
+                    <a:lumMod val="75000"/>
+                  </a:schemeClr>
+                </a:solidFill>
+              </a:rPr>
+              <a:t>// stores coloring of each node</a:t>
+            </a:r>
+            <a:endParaRPr lang="en-US" sz="1600" dirty="0"/>
+          </a:p>
+          <a:p>
+            <a:pPr marL="0" indent="0">
+              <a:lnSpc>
+                <a:spcPct val="150000"/>
+              </a:lnSpc>
+              <a:buNone/>
+            </a:pPr>
+            <a:r>
+              <a:rPr lang="en-US" sz="1600" dirty="0"/>
+              <a:t>	</a:t>
+            </a:r>
+            <a:r>
+              <a:rPr lang="en-US" sz="1600" dirty="0" err="1"/>
+              <a:t>available_colors</a:t>
+            </a:r>
+            <a:r>
+              <a:rPr lang="en-US" sz="1600" dirty="0"/>
+              <a:t>[V] </a:t>
+            </a:r>
+            <a:r>
+              <a:rPr lang="en-US" sz="1600" dirty="0">
+                <a:solidFill>
+                  <a:schemeClr val="accent1">
+                    <a:lumMod val="75000"/>
+                  </a:schemeClr>
+                </a:solidFill>
+              </a:rPr>
+              <a:t>// tracks which colors are available for each iteration</a:t>
+            </a:r>
+            <a:endParaRPr lang="en-US" sz="1600" dirty="0"/>
+          </a:p>
+          <a:p>
+            <a:pPr marL="0" indent="0">
+              <a:lnSpc>
+                <a:spcPct val="150000"/>
+              </a:lnSpc>
+              <a:buNone/>
+            </a:pPr>
+            <a:r>
+              <a:rPr lang="en-US" sz="1600" dirty="0"/>
+              <a:t>	result[0] = 0</a:t>
+            </a:r>
+          </a:p>
+          <a:p>
+            <a:pPr marL="0" indent="0">
+              <a:lnSpc>
+                <a:spcPct val="150000"/>
+              </a:lnSpc>
+              <a:buNone/>
+            </a:pPr>
+            <a:r>
+              <a:rPr lang="en-US" sz="1600" dirty="0"/>
+              <a:t>	for each vertex u in G: </a:t>
+            </a:r>
+          </a:p>
+          <a:p>
+            <a:pPr marL="0" indent="0">
+              <a:lnSpc>
+                <a:spcPct val="150000"/>
+              </a:lnSpc>
+              <a:buNone/>
+            </a:pPr>
+            <a:r>
+              <a:rPr lang="en-US" sz="1600" dirty="0"/>
+              <a:t>		for each vertex v adjacent to u:</a:t>
+            </a:r>
+          </a:p>
+          <a:p>
+            <a:pPr marL="0" indent="0">
+              <a:lnSpc>
+                <a:spcPct val="150000"/>
+              </a:lnSpc>
+              <a:buNone/>
+            </a:pPr>
+            <a:r>
+              <a:rPr lang="en-US" sz="1600" dirty="0"/>
+              <a:t>			set coloring of v to unavailable</a:t>
+            </a:r>
+          </a:p>
+          <a:p>
+            <a:pPr marL="0" indent="0">
+              <a:lnSpc>
+                <a:spcPct val="150000"/>
+              </a:lnSpc>
+              <a:buNone/>
+            </a:pPr>
+            <a:r>
+              <a:rPr lang="en-US" sz="1600" dirty="0"/>
+              <a:t>		color = 0</a:t>
+            </a:r>
+          </a:p>
+          <a:p>
+            <a:pPr marL="0" indent="0">
+              <a:lnSpc>
+                <a:spcPct val="150000"/>
+              </a:lnSpc>
+              <a:buNone/>
+            </a:pPr>
+            <a:r>
+              <a:rPr lang="en-US" sz="1600" dirty="0"/>
+              <a:t>		while color &lt; V:</a:t>
+            </a:r>
+          </a:p>
+          <a:p>
+            <a:pPr marL="0" indent="0">
+              <a:lnSpc>
+                <a:spcPct val="150000"/>
+              </a:lnSpc>
+              <a:buNone/>
+            </a:pPr>
+            <a:r>
+              <a:rPr lang="en-US" sz="1600" dirty="0"/>
+              <a:t>			if color is available:</a:t>
+            </a:r>
+          </a:p>
+          <a:p>
+            <a:pPr marL="0" indent="0">
+              <a:lnSpc>
+                <a:spcPct val="150000"/>
+              </a:lnSpc>
+              <a:buNone/>
+            </a:pPr>
+            <a:r>
+              <a:rPr lang="en-US" sz="1600" dirty="0"/>
+              <a:t>				break</a:t>
+            </a:r>
+          </a:p>
+          <a:p>
+            <a:pPr marL="0" indent="0">
+              <a:lnSpc>
+                <a:spcPct val="150000"/>
+              </a:lnSpc>
+              <a:buNone/>
+            </a:pPr>
+            <a:r>
+              <a:rPr lang="en-US" sz="1600" dirty="0"/>
+              <a:t>			color += 1</a:t>
+            </a:r>
+          </a:p>
+          <a:p>
+            <a:pPr marL="0" indent="0">
+              <a:lnSpc>
+                <a:spcPct val="150000"/>
+              </a:lnSpc>
+              <a:buNone/>
+            </a:pPr>
+            <a:r>
+              <a:rPr lang="en-US" sz="1600" dirty="0"/>
+              <a:t>		result[u] = color</a:t>
+            </a:r>
+          </a:p>
+          <a:p>
+            <a:pPr marL="0" indent="0">
+              <a:lnSpc>
+                <a:spcPct val="150000"/>
+              </a:lnSpc>
+              <a:buNone/>
+            </a:pPr>
+            <a:r>
+              <a:rPr lang="en-US" sz="1600" dirty="0"/>
+              <a:t>		for C in </a:t>
+            </a:r>
+            <a:r>
+              <a:rPr lang="en-US" sz="1600" dirty="0" err="1"/>
+              <a:t>available_colors</a:t>
+            </a:r>
+            <a:r>
+              <a:rPr lang="en-US" sz="1600" dirty="0"/>
+              <a:t>:</a:t>
+            </a:r>
+          </a:p>
+          <a:p>
+            <a:pPr marL="0" indent="0">
+              <a:lnSpc>
+                <a:spcPct val="150000"/>
+              </a:lnSpc>
+              <a:buNone/>
+            </a:pPr>
+            <a:r>
+              <a:rPr lang="en-US" sz="1600" dirty="0"/>
+              <a:t>			set C as Available</a:t>
             </a:r>
           </a:p>
           <a:p>
@@ -20634,7 +20879,7 @@
             </a:pPr>
             <a:r>
               <a:rPr lang="en-US" sz="1600" dirty="0"/>
-              <a:t>	result[-1 * V]</a:t>
+              <a:t>			</a:t>
             </a:r>
           </a:p>
           <a:p>
@@ -20643,7 +20888,7 @@
             </a:pPr>
             <a:r>
               <a:rPr lang="en-US" sz="1600" dirty="0"/>
-              <a:t>	available_colors[false * V]</a:t>
+              <a:t>		</a:t>
             </a:r>
           </a:p>
           <a:p>
@@ -20652,107 +20897,11 @@
             </a:pPr>
             <a:r>
               <a:rPr lang="en-US" sz="1600" dirty="0"/>
-              <a:t>	result[0] = 0</a:t>
+              <a:t>		</a:t>
             </a:r>
           </a:p>
           <a:p>
-            <a:pPr marL="0" indent="0">
-              <a:buNone/>
-            </a:pPr>
-            <a:r>
-              <a:rPr lang="en-US" sz="1600" dirty="0"/>
-              <a:t>	for u in range(1, V):</a:t>
-            </a:r>
-          </a:p>
-          <a:p>
-            <a:pPr marL="0" indent="0">
-              <a:buNone/>
-            </a:pPr>
-            <a:r>
-              <a:rPr lang="en-US" sz="1600" dirty="0"/>
-              <a:t>		for each node x that is adjacent to u:</a:t>
-            </a:r>
-          </a:p>
-          <a:p>
-            <a:pPr marL="0" indent="0">
-              <a:buNone/>
-            </a:pPr>
-            <a:r>
-              <a:rPr lang="en-US" sz="1600" dirty="0"/>
-              <a:t>			if result[x] != -1:  // if the node has been assigned a color</a:t>
-            </a:r>
-          </a:p>
-          <a:p>
-            <a:pPr marL="0" indent="0">
-              <a:buNone/>
-            </a:pPr>
-            <a:r>
-              <a:rPr lang="en-US" sz="1600" dirty="0"/>
-              <a:t>				available_colors[result[x]] = true</a:t>
-            </a:r>
-          </a:p>
-          <a:p>
-            <a:pPr marL="0" indent="0">
-              <a:buNone/>
-            </a:pPr>
-            <a:r>
-              <a:rPr lang="en-US" sz="1600" dirty="0"/>
-              <a:t>		// Find next available color and assign it to that nodes result</a:t>
-            </a:r>
-          </a:p>
-          <a:p>
-            <a:pPr marL="0" indent="0">
-              <a:buNone/>
-            </a:pPr>
-            <a:r>
-              <a:rPr lang="en-US" sz="1600" dirty="0"/>
-              <a:t>		color = 0</a:t>
-            </a:r>
-          </a:p>
-          <a:p>
-            <a:pPr marL="0" indent="0">
-              <a:buNone/>
-            </a:pPr>
-            <a:r>
-              <a:rPr lang="en-US" sz="1600" dirty="0"/>
-              <a:t>		while color &lt; V:</a:t>
-            </a:r>
-          </a:p>
-          <a:p>
-            <a:pPr marL="0" indent="0">
-              <a:buNone/>
-            </a:pPr>
-            <a:r>
-              <a:rPr lang="en-US" sz="1600" dirty="0"/>
-              <a:t>			if available_colors[color] == false:</a:t>
-            </a:r>
-          </a:p>
-          <a:p>
-            <a:pPr marL="0" indent="0">
-              <a:buNone/>
-            </a:pPr>
-            <a:r>
-              <a:rPr lang="en-US" sz="1600" dirty="0"/>
-              <a:t>				break</a:t>
-            </a:r>
-          </a:p>
-          <a:p>
-            <a:pPr marL="0" indent="0">
-              <a:buNone/>
-            </a:pPr>
-            <a:r>
-              <a:rPr lang="en-US" sz="1600" dirty="0"/>
-              <a:t>			color += 1</a:t>
-            </a:r>
-          </a:p>
-          <a:p>
-            <a:pPr marL="0" indent="0">
-              <a:buNone/>
-            </a:pPr>
-            <a:r>
-              <a:rPr lang="en-US" sz="1600" dirty="0"/>
-              <a:t>		result[u] = color</a:t>
-            </a:r>
+            <a:endParaRPr lang="en-US" sz="1600" dirty="0"/>
           </a:p>
         </p:txBody>
       </p:sp>
@@ -28452,7 +28601,7 @@
           <p:cNvPr id="2" name="Title 1">
             <a:extLst>
               <a:ext uri="{FF2B5EF4-FFF2-40B4-BE49-F238E27FC236}">
-                <a16:creationId xmlns:a16="http://schemas.microsoft.com/office/drawing/2014/main" id="{41A4FF66-FEBC-462D-B4E4-BFB2746A07C7}"/>
+                <a16:creationId xmlns:a16="http://schemas.microsoft.com/office/drawing/2014/main" id="{2E282B34-265C-48FE-A532-76FA696D3AB1}"/>
               </a:ext>
             </a:extLst>
           </p:cNvPr>
@@ -28469,77 +28618,729 @@
           <a:lstStyle/>
           <a:p>
             <a:r>
-              <a:rPr lang="en-US" dirty="0">
-                <a:solidFill>
-                  <a:srgbClr val="000000"/>
-                </a:solidFill>
-                <a:effectLst/>
-              </a:rPr>
-              <a:t>analytical run time analysis (big-O) of your approximation algorithm</a:t>
-            </a:r>
-            <a:endParaRPr lang="en-US" dirty="0"/>
+              <a:rPr lang="en-US" dirty="0"/>
+              <a:t>How it Works with a “Bad” ordering</a:t>
+            </a:r>
+          </a:p>
+        </p:txBody>
+      </p:sp>
+      <p:cxnSp>
+        <p:nvCxnSpPr>
+          <p:cNvPr id="17" name="Straight Arrow Connector 16">
+            <a:extLst>
+              <a:ext uri="{FF2B5EF4-FFF2-40B4-BE49-F238E27FC236}">
+                <a16:creationId xmlns:a16="http://schemas.microsoft.com/office/drawing/2014/main" id="{FDA197CF-8CFF-43B2-9EAE-580F90274A20}"/>
+              </a:ext>
+            </a:extLst>
+          </p:cNvPr>
+          <p:cNvCxnSpPr>
+            <a:cxnSpLocks/>
+          </p:cNvCxnSpPr>
+          <p:nvPr/>
+        </p:nvCxnSpPr>
+        <p:spPr>
+          <a:xfrm flipH="1">
+            <a:off x="5897568" y="5853771"/>
+            <a:ext cx="396864" cy="0"/>
+          </a:xfrm>
+          <a:prstGeom prst="straightConnector1">
+            <a:avLst/>
+          </a:prstGeom>
+          <a:ln>
+            <a:tailEnd type="triangle"/>
+          </a:ln>
+        </p:spPr>
+        <p:style>
+          <a:lnRef idx="3">
+            <a:schemeClr val="dk1"/>
+          </a:lnRef>
+          <a:fillRef idx="0">
+            <a:schemeClr val="dk1"/>
+          </a:fillRef>
+          <a:effectRef idx="2">
+            <a:schemeClr val="dk1"/>
+          </a:effectRef>
+          <a:fontRef idx="minor">
+            <a:schemeClr val="tx1"/>
+          </a:fontRef>
+        </p:style>
+      </p:cxnSp>
+      <p:pic>
+        <p:nvPicPr>
+          <p:cNvPr id="4" name="Picture 3" descr="Shape, circle&#10;&#10;Description automatically generated">
+            <a:extLst>
+              <a:ext uri="{FF2B5EF4-FFF2-40B4-BE49-F238E27FC236}">
+                <a16:creationId xmlns:a16="http://schemas.microsoft.com/office/drawing/2014/main" id="{2B32760B-85E1-413D-A633-EBA7907CA499}"/>
+              </a:ext>
+            </a:extLst>
+          </p:cNvPr>
+          <p:cNvPicPr>
+            <a:picLocks noChangeAspect="1"/>
+          </p:cNvPicPr>
+          <p:nvPr/>
+        </p:nvPicPr>
+        <p:blipFill>
+          <a:blip r:embed="rId2">
+            <a:extLst>
+              <a:ext uri="{28A0092B-C50C-407E-A947-70E740481C1C}">
+                <a14:useLocalDpi xmlns:a14="http://schemas.microsoft.com/office/drawing/2010/main" val="0"/>
+              </a:ext>
+            </a:extLst>
+          </a:blip>
+          <a:stretch>
+            <a:fillRect/>
+          </a:stretch>
+        </p:blipFill>
+        <p:spPr>
+          <a:xfrm>
+            <a:off x="453416" y="1188855"/>
+            <a:ext cx="5264643" cy="5264643"/>
+          </a:xfrm>
+          <a:prstGeom prst="rect">
+            <a:avLst/>
+          </a:prstGeom>
+        </p:spPr>
+      </p:pic>
+      <p:sp>
+        <p:nvSpPr>
+          <p:cNvPr id="23" name="Oval 22">
+            <a:extLst>
+              <a:ext uri="{FF2B5EF4-FFF2-40B4-BE49-F238E27FC236}">
+                <a16:creationId xmlns:a16="http://schemas.microsoft.com/office/drawing/2014/main" id="{B78FE048-9B4C-410C-8919-F98EA8C5B14C}"/>
+              </a:ext>
+            </a:extLst>
+          </p:cNvPr>
+          <p:cNvSpPr/>
+          <p:nvPr/>
+        </p:nvSpPr>
+        <p:spPr>
+          <a:xfrm>
+            <a:off x="1987994" y="5803935"/>
+            <a:ext cx="158750" cy="166169"/>
+          </a:xfrm>
+          <a:prstGeom prst="ellipse">
+            <a:avLst/>
+          </a:prstGeom>
+          <a:solidFill>
+            <a:srgbClr val="FF0000"/>
+          </a:solidFill>
+          <a:ln>
+            <a:noFill/>
+          </a:ln>
+        </p:spPr>
+        <p:style>
+          <a:lnRef idx="0">
+            <a:scrgbClr r="0" g="0" b="0"/>
+          </a:lnRef>
+          <a:fillRef idx="0">
+            <a:scrgbClr r="0" g="0" b="0"/>
+          </a:fillRef>
+          <a:effectRef idx="0">
+            <a:scrgbClr r="0" g="0" b="0"/>
+          </a:effectRef>
+          <a:fontRef idx="minor">
+            <a:schemeClr val="dk1"/>
+          </a:fontRef>
+        </p:style>
+        <p:txBody>
+          <a:bodyPr rtlCol="0" anchor="ctr"/>
+          <a:lstStyle/>
+          <a:p>
+            <a:pPr algn="ctr"/>
+            <a:endParaRPr lang="en-US"/>
           </a:p>
         </p:txBody>
       </p:sp>
       <p:sp>
         <p:nvSpPr>
-          <p:cNvPr id="3" name="Content Placeholder 2">
+          <p:cNvPr id="13" name="Oval 12">
             <a:extLst>
               <a:ext uri="{FF2B5EF4-FFF2-40B4-BE49-F238E27FC236}">
-                <a16:creationId xmlns:a16="http://schemas.microsoft.com/office/drawing/2014/main" id="{96230890-F9D9-4140-9C26-8B6729B9309E}"/>
+                <a16:creationId xmlns:a16="http://schemas.microsoft.com/office/drawing/2014/main" id="{0F4DB3CD-65F1-4A09-9627-88951202FC41}"/>
               </a:ext>
             </a:extLst>
           </p:cNvPr>
-          <p:cNvSpPr>
-            <a:spLocks noGrp="1"/>
-          </p:cNvSpPr>
-          <p:nvPr>
-            <p:ph idx="1"/>
-          </p:nvPr>
+          <p:cNvSpPr/>
+          <p:nvPr/>
         </p:nvSpPr>
-        <p:spPr/>
+        <p:spPr>
+          <a:xfrm>
+            <a:off x="3395036" y="5744198"/>
+            <a:ext cx="158750" cy="166169"/>
+          </a:xfrm>
+          <a:prstGeom prst="ellipse">
+            <a:avLst/>
+          </a:prstGeom>
+          <a:solidFill>
+            <a:srgbClr val="FF0000"/>
+          </a:solidFill>
+          <a:ln>
+            <a:noFill/>
+          </a:ln>
+        </p:spPr>
+        <p:style>
+          <a:lnRef idx="0">
+            <a:scrgbClr r="0" g="0" b="0"/>
+          </a:lnRef>
+          <a:fillRef idx="0">
+            <a:scrgbClr r="0" g="0" b="0"/>
+          </a:fillRef>
+          <a:effectRef idx="0">
+            <a:scrgbClr r="0" g="0" b="0"/>
+          </a:effectRef>
+          <a:fontRef idx="minor">
+            <a:schemeClr val="dk1"/>
+          </a:fontRef>
+        </p:style>
         <p:txBody>
-          <a:bodyPr/>
+          <a:bodyPr rtlCol="0" anchor="ctr"/>
           <a:lstStyle/>
           <a:p>
-            <a:r>
-              <a:rPr lang="en-US" dirty="0"/>
-              <a:t>Approximation: O(V^2 * E)</a:t>
-            </a:r>
+            <a:pPr algn="ctr"/>
+            <a:endParaRPr lang="en-US"/>
           </a:p>
+        </p:txBody>
+      </p:sp>
+      <p:sp>
+        <p:nvSpPr>
+          <p:cNvPr id="15" name="Oval 14">
+            <a:extLst>
+              <a:ext uri="{FF2B5EF4-FFF2-40B4-BE49-F238E27FC236}">
+                <a16:creationId xmlns:a16="http://schemas.microsoft.com/office/drawing/2014/main" id="{E82F6749-584E-4BEC-BA4D-B7CCFE641EAE}"/>
+              </a:ext>
+            </a:extLst>
+          </p:cNvPr>
+          <p:cNvSpPr/>
+          <p:nvPr/>
+        </p:nvSpPr>
+        <p:spPr>
+          <a:xfrm>
+            <a:off x="3776033" y="3969716"/>
+            <a:ext cx="158750" cy="166169"/>
+          </a:xfrm>
+          <a:prstGeom prst="ellipse">
+            <a:avLst/>
+          </a:prstGeom>
+          <a:solidFill>
+            <a:srgbClr val="0070C0"/>
+          </a:solidFill>
+          <a:ln>
+            <a:noFill/>
+          </a:ln>
+        </p:spPr>
+        <p:style>
+          <a:lnRef idx="0">
+            <a:scrgbClr r="0" g="0" b="0"/>
+          </a:lnRef>
+          <a:fillRef idx="0">
+            <a:scrgbClr r="0" g="0" b="0"/>
+          </a:fillRef>
+          <a:effectRef idx="0">
+            <a:scrgbClr r="0" g="0" b="0"/>
+          </a:effectRef>
+          <a:fontRef idx="minor">
+            <a:schemeClr val="dk1"/>
+          </a:fontRef>
+        </p:style>
+        <p:txBody>
+          <a:bodyPr rtlCol="0" anchor="ctr"/>
+          <a:lstStyle/>
           <a:p>
-            <a:endParaRPr lang="en-US" dirty="0"/>
+            <a:pPr algn="ctr"/>
+            <a:endParaRPr lang="en-US"/>
           </a:p>
+        </p:txBody>
+      </p:sp>
+      <p:sp>
+        <p:nvSpPr>
+          <p:cNvPr id="16" name="Oval 15">
+            <a:extLst>
+              <a:ext uri="{FF2B5EF4-FFF2-40B4-BE49-F238E27FC236}">
+                <a16:creationId xmlns:a16="http://schemas.microsoft.com/office/drawing/2014/main" id="{22DDAE4E-FA8F-468B-A366-2234D54167D4}"/>
+              </a:ext>
+            </a:extLst>
+          </p:cNvPr>
+          <p:cNvSpPr/>
+          <p:nvPr/>
+        </p:nvSpPr>
+        <p:spPr>
+          <a:xfrm>
+            <a:off x="1563723" y="3969715"/>
+            <a:ext cx="158750" cy="166169"/>
+          </a:xfrm>
+          <a:prstGeom prst="ellipse">
+            <a:avLst/>
+          </a:prstGeom>
+          <a:solidFill>
+            <a:srgbClr val="0070C0"/>
+          </a:solidFill>
+          <a:ln>
+            <a:noFill/>
+          </a:ln>
+        </p:spPr>
+        <p:style>
+          <a:lnRef idx="0">
+            <a:scrgbClr r="0" g="0" b="0"/>
+          </a:lnRef>
+          <a:fillRef idx="0">
+            <a:scrgbClr r="0" g="0" b="0"/>
+          </a:fillRef>
+          <a:effectRef idx="0">
+            <a:scrgbClr r="0" g="0" b="0"/>
+          </a:effectRef>
+          <a:fontRef idx="minor">
+            <a:schemeClr val="dk1"/>
+          </a:fontRef>
+        </p:style>
+        <p:txBody>
+          <a:bodyPr rtlCol="0" anchor="ctr"/>
+          <a:lstStyle/>
           <a:p>
-            <a:r>
-              <a:rPr lang="en-US" dirty="0"/>
-              <a:t>Why is this the big O???</a:t>
-            </a:r>
+            <a:pPr algn="ctr"/>
+            <a:endParaRPr lang="en-US"/>
           </a:p>
+        </p:txBody>
+      </p:sp>
+      <p:sp>
+        <p:nvSpPr>
+          <p:cNvPr id="18" name="Oval 17">
+            <a:extLst>
+              <a:ext uri="{FF2B5EF4-FFF2-40B4-BE49-F238E27FC236}">
+                <a16:creationId xmlns:a16="http://schemas.microsoft.com/office/drawing/2014/main" id="{A6E0DB8B-2E62-4D9F-A54E-EAE88D1793C7}"/>
+              </a:ext>
+            </a:extLst>
+          </p:cNvPr>
+          <p:cNvSpPr/>
+          <p:nvPr/>
+        </p:nvSpPr>
+        <p:spPr>
+          <a:xfrm>
+            <a:off x="1643098" y="2537972"/>
+            <a:ext cx="158750" cy="166169"/>
+          </a:xfrm>
+          <a:prstGeom prst="ellipse">
+            <a:avLst/>
+          </a:prstGeom>
+          <a:solidFill>
+            <a:schemeClr val="accent2"/>
+          </a:solidFill>
+          <a:ln>
+            <a:noFill/>
+          </a:ln>
+        </p:spPr>
+        <p:style>
+          <a:lnRef idx="0">
+            <a:scrgbClr r="0" g="0" b="0"/>
+          </a:lnRef>
+          <a:fillRef idx="0">
+            <a:scrgbClr r="0" g="0" b="0"/>
+          </a:fillRef>
+          <a:effectRef idx="0">
+            <a:scrgbClr r="0" g="0" b="0"/>
+          </a:effectRef>
+          <a:fontRef idx="minor">
+            <a:schemeClr val="dk1"/>
+          </a:fontRef>
+        </p:style>
+        <p:txBody>
+          <a:bodyPr rtlCol="0" anchor="ctr"/>
+          <a:lstStyle/>
           <a:p>
-            <a:r>
-              <a:rPr lang="en-US" dirty="0"/>
-              <a:t>The algorithm loops through all vertices.</a:t>
-            </a:r>
+            <a:pPr algn="ctr"/>
+            <a:endParaRPr lang="en-US"/>
           </a:p>
+        </p:txBody>
+      </p:sp>
+      <p:sp>
+        <p:nvSpPr>
+          <p:cNvPr id="19" name="Oval 18">
+            <a:extLst>
+              <a:ext uri="{FF2B5EF4-FFF2-40B4-BE49-F238E27FC236}">
+                <a16:creationId xmlns:a16="http://schemas.microsoft.com/office/drawing/2014/main" id="{E266E9D2-9859-4786-A17E-FC9961EE0FB6}"/>
+              </a:ext>
+            </a:extLst>
+          </p:cNvPr>
+          <p:cNvSpPr/>
+          <p:nvPr/>
+        </p:nvSpPr>
+        <p:spPr>
+          <a:xfrm>
+            <a:off x="3729897" y="2480715"/>
+            <a:ext cx="158750" cy="166169"/>
+          </a:xfrm>
+          <a:prstGeom prst="ellipse">
+            <a:avLst/>
+          </a:prstGeom>
+          <a:solidFill>
+            <a:schemeClr val="accent2"/>
+          </a:solidFill>
+          <a:ln>
+            <a:noFill/>
+          </a:ln>
+        </p:spPr>
+        <p:style>
+          <a:lnRef idx="0">
+            <a:scrgbClr r="0" g="0" b="0"/>
+          </a:lnRef>
+          <a:fillRef idx="0">
+            <a:scrgbClr r="0" g="0" b="0"/>
+          </a:fillRef>
+          <a:effectRef idx="0">
+            <a:scrgbClr r="0" g="0" b="0"/>
+          </a:effectRef>
+          <a:fontRef idx="minor">
+            <a:schemeClr val="dk1"/>
+          </a:fontRef>
+        </p:style>
+        <p:txBody>
+          <a:bodyPr rtlCol="0" anchor="ctr"/>
+          <a:lstStyle/>
           <a:p>
-            <a:r>
-              <a:rPr lang="en-US" dirty="0"/>
-              <a:t>Within that loop it loops through the colors of which there are V</a:t>
-            </a:r>
+            <a:pPr algn="ctr"/>
+            <a:endParaRPr lang="en-US"/>
           </a:p>
+        </p:txBody>
+      </p:sp>
+      <p:pic>
+        <p:nvPicPr>
+          <p:cNvPr id="24" name="Picture 23" descr="Shape, circle&#10;&#10;Description automatically generated">
+            <a:extLst>
+              <a:ext uri="{FF2B5EF4-FFF2-40B4-BE49-F238E27FC236}">
+                <a16:creationId xmlns:a16="http://schemas.microsoft.com/office/drawing/2014/main" id="{889C50DE-5B13-47AF-AC3D-5176928720F0}"/>
+              </a:ext>
+            </a:extLst>
+          </p:cNvPr>
+          <p:cNvPicPr>
+            <a:picLocks noChangeAspect="1"/>
+          </p:cNvPicPr>
+          <p:nvPr/>
+        </p:nvPicPr>
+        <p:blipFill>
+          <a:blip r:embed="rId2">
+            <a:extLst>
+              <a:ext uri="{28A0092B-C50C-407E-A947-70E740481C1C}">
+                <a14:useLocalDpi xmlns:a14="http://schemas.microsoft.com/office/drawing/2010/main" val="0"/>
+              </a:ext>
+            </a:extLst>
+          </a:blip>
+          <a:stretch>
+            <a:fillRect/>
+          </a:stretch>
+        </p:blipFill>
+        <p:spPr>
+          <a:xfrm>
+            <a:off x="3942844" y="1221984"/>
+            <a:ext cx="5264643" cy="5264643"/>
+          </a:xfrm>
+          <a:prstGeom prst="rect">
+            <a:avLst/>
+          </a:prstGeom>
+        </p:spPr>
+      </p:pic>
+      <p:sp>
+        <p:nvSpPr>
+          <p:cNvPr id="25" name="Oval 24">
+            <a:extLst>
+              <a:ext uri="{FF2B5EF4-FFF2-40B4-BE49-F238E27FC236}">
+                <a16:creationId xmlns:a16="http://schemas.microsoft.com/office/drawing/2014/main" id="{75BD3ADD-BF67-47EB-BA27-9C241CFE5B76}"/>
+              </a:ext>
+            </a:extLst>
+          </p:cNvPr>
+          <p:cNvSpPr/>
+          <p:nvPr/>
+        </p:nvSpPr>
+        <p:spPr>
+          <a:xfrm>
+            <a:off x="5477422" y="5837064"/>
+            <a:ext cx="158750" cy="166169"/>
+          </a:xfrm>
+          <a:prstGeom prst="ellipse">
+            <a:avLst/>
+          </a:prstGeom>
+          <a:solidFill>
+            <a:srgbClr val="FF0000"/>
+          </a:solidFill>
+          <a:ln>
+            <a:noFill/>
+          </a:ln>
+        </p:spPr>
+        <p:style>
+          <a:lnRef idx="0">
+            <a:scrgbClr r="0" g="0" b="0"/>
+          </a:lnRef>
+          <a:fillRef idx="0">
+            <a:scrgbClr r="0" g="0" b="0"/>
+          </a:fillRef>
+          <a:effectRef idx="0">
+            <a:scrgbClr r="0" g="0" b="0"/>
+          </a:effectRef>
+          <a:fontRef idx="minor">
+            <a:schemeClr val="dk1"/>
+          </a:fontRef>
+        </p:style>
+        <p:txBody>
+          <a:bodyPr rtlCol="0" anchor="ctr"/>
+          <a:lstStyle/>
           <a:p>
-            <a:r>
-              <a:rPr lang="en-US" dirty="0"/>
-              <a:t>It also loops through the Edges </a:t>
-            </a:r>
+            <a:pPr algn="ctr"/>
+            <a:endParaRPr lang="en-US"/>
+          </a:p>
+        </p:txBody>
+      </p:sp>
+      <p:sp>
+        <p:nvSpPr>
+          <p:cNvPr id="27" name="Oval 26">
+            <a:extLst>
+              <a:ext uri="{FF2B5EF4-FFF2-40B4-BE49-F238E27FC236}">
+                <a16:creationId xmlns:a16="http://schemas.microsoft.com/office/drawing/2014/main" id="{631D8817-DB7A-4F45-8892-12C0B280F480}"/>
+              </a:ext>
+            </a:extLst>
+          </p:cNvPr>
+          <p:cNvSpPr/>
+          <p:nvPr/>
+        </p:nvSpPr>
+        <p:spPr>
+          <a:xfrm>
+            <a:off x="5122587" y="4061963"/>
+            <a:ext cx="158750" cy="166169"/>
+          </a:xfrm>
+          <a:prstGeom prst="ellipse">
+            <a:avLst/>
+          </a:prstGeom>
+          <a:solidFill>
+            <a:srgbClr val="0070C0"/>
+          </a:solidFill>
+          <a:ln>
+            <a:noFill/>
+          </a:ln>
+        </p:spPr>
+        <p:style>
+          <a:lnRef idx="0">
+            <a:scrgbClr r="0" g="0" b="0"/>
+          </a:lnRef>
+          <a:fillRef idx="0">
+            <a:scrgbClr r="0" g="0" b="0"/>
+          </a:fillRef>
+          <a:effectRef idx="0">
+            <a:scrgbClr r="0" g="0" b="0"/>
+          </a:effectRef>
+          <a:fontRef idx="minor">
+            <a:schemeClr val="dk1"/>
+          </a:fontRef>
+        </p:style>
+        <p:txBody>
+          <a:bodyPr rtlCol="0" anchor="ctr"/>
+          <a:lstStyle/>
+          <a:p>
+            <a:pPr algn="ctr"/>
+            <a:endParaRPr lang="en-US"/>
+          </a:p>
+        </p:txBody>
+      </p:sp>
+      <p:sp>
+        <p:nvSpPr>
+          <p:cNvPr id="28" name="Oval 27">
+            <a:extLst>
+              <a:ext uri="{FF2B5EF4-FFF2-40B4-BE49-F238E27FC236}">
+                <a16:creationId xmlns:a16="http://schemas.microsoft.com/office/drawing/2014/main" id="{2E4B308E-30BA-4140-A224-A418C8D261B6}"/>
+              </a:ext>
+            </a:extLst>
+          </p:cNvPr>
+          <p:cNvSpPr/>
+          <p:nvPr/>
+        </p:nvSpPr>
+        <p:spPr>
+          <a:xfrm>
+            <a:off x="6884464" y="5812618"/>
+            <a:ext cx="158750" cy="166169"/>
+          </a:xfrm>
+          <a:prstGeom prst="ellipse">
+            <a:avLst/>
+          </a:prstGeom>
+          <a:solidFill>
+            <a:srgbClr val="0070C0"/>
+          </a:solidFill>
+          <a:ln>
+            <a:noFill/>
+          </a:ln>
+        </p:spPr>
+        <p:style>
+          <a:lnRef idx="0">
+            <a:scrgbClr r="0" g="0" b="0"/>
+          </a:lnRef>
+          <a:fillRef idx="0">
+            <a:scrgbClr r="0" g="0" b="0"/>
+          </a:fillRef>
+          <a:effectRef idx="0">
+            <a:scrgbClr r="0" g="0" b="0"/>
+          </a:effectRef>
+          <a:fontRef idx="minor">
+            <a:schemeClr val="dk1"/>
+          </a:fontRef>
+        </p:style>
+        <p:txBody>
+          <a:bodyPr rtlCol="0" anchor="ctr"/>
+          <a:lstStyle/>
+          <a:p>
+            <a:pPr algn="ctr"/>
+            <a:endParaRPr lang="en-US"/>
+          </a:p>
+        </p:txBody>
+      </p:sp>
+      <p:sp>
+        <p:nvSpPr>
+          <p:cNvPr id="31" name="Oval 30">
+            <a:extLst>
+              <a:ext uri="{FF2B5EF4-FFF2-40B4-BE49-F238E27FC236}">
+                <a16:creationId xmlns:a16="http://schemas.microsoft.com/office/drawing/2014/main" id="{611320D3-EF1A-4BE9-89E1-FF7F1DCF68DA}"/>
+              </a:ext>
+            </a:extLst>
+          </p:cNvPr>
+          <p:cNvSpPr/>
+          <p:nvPr/>
+        </p:nvSpPr>
+        <p:spPr>
+          <a:xfrm>
+            <a:off x="7254465" y="4015837"/>
+            <a:ext cx="158750" cy="166169"/>
+          </a:xfrm>
+          <a:prstGeom prst="ellipse">
+            <a:avLst/>
+          </a:prstGeom>
+          <a:solidFill>
+            <a:srgbClr val="FF0000"/>
+          </a:solidFill>
+          <a:ln>
+            <a:noFill/>
+          </a:ln>
+        </p:spPr>
+        <p:style>
+          <a:lnRef idx="0">
+            <a:scrgbClr r="0" g="0" b="0"/>
+          </a:lnRef>
+          <a:fillRef idx="0">
+            <a:scrgbClr r="0" g="0" b="0"/>
+          </a:fillRef>
+          <a:effectRef idx="0">
+            <a:scrgbClr r="0" g="0" b="0"/>
+          </a:effectRef>
+          <a:fontRef idx="minor">
+            <a:schemeClr val="dk1"/>
+          </a:fontRef>
+        </p:style>
+        <p:txBody>
+          <a:bodyPr rtlCol="0" anchor="ctr"/>
+          <a:lstStyle/>
+          <a:p>
+            <a:pPr algn="ctr"/>
+            <a:endParaRPr lang="en-US"/>
+          </a:p>
+        </p:txBody>
+      </p:sp>
+      <p:sp>
+        <p:nvSpPr>
+          <p:cNvPr id="32" name="Oval 31">
+            <a:extLst>
+              <a:ext uri="{FF2B5EF4-FFF2-40B4-BE49-F238E27FC236}">
+                <a16:creationId xmlns:a16="http://schemas.microsoft.com/office/drawing/2014/main" id="{4EBB175F-0CCB-4BCF-8DBD-627DB17364A1}"/>
+              </a:ext>
+            </a:extLst>
+          </p:cNvPr>
+          <p:cNvSpPr/>
+          <p:nvPr/>
+        </p:nvSpPr>
+        <p:spPr>
+          <a:xfrm>
+            <a:off x="5115707" y="2481132"/>
+            <a:ext cx="158750" cy="166169"/>
+          </a:xfrm>
+          <a:prstGeom prst="ellipse">
+            <a:avLst/>
+          </a:prstGeom>
+          <a:solidFill>
+            <a:srgbClr val="FF0000"/>
+          </a:solidFill>
+          <a:ln>
+            <a:noFill/>
+          </a:ln>
+        </p:spPr>
+        <p:style>
+          <a:lnRef idx="0">
+            <a:scrgbClr r="0" g="0" b="0"/>
+          </a:lnRef>
+          <a:fillRef idx="0">
+            <a:scrgbClr r="0" g="0" b="0"/>
+          </a:fillRef>
+          <a:effectRef idx="0">
+            <a:scrgbClr r="0" g="0" b="0"/>
+          </a:effectRef>
+          <a:fontRef idx="minor">
+            <a:schemeClr val="dk1"/>
+          </a:fontRef>
+        </p:style>
+        <p:txBody>
+          <a:bodyPr rtlCol="0" anchor="ctr"/>
+          <a:lstStyle/>
+          <a:p>
+            <a:pPr algn="ctr"/>
+            <a:endParaRPr lang="en-US"/>
+          </a:p>
+        </p:txBody>
+      </p:sp>
+      <p:sp>
+        <p:nvSpPr>
+          <p:cNvPr id="33" name="Oval 32">
+            <a:extLst>
+              <a:ext uri="{FF2B5EF4-FFF2-40B4-BE49-F238E27FC236}">
+                <a16:creationId xmlns:a16="http://schemas.microsoft.com/office/drawing/2014/main" id="{FFF760B5-36B8-4CBC-9EA6-666D29A3C848}"/>
+              </a:ext>
+            </a:extLst>
+          </p:cNvPr>
+          <p:cNvSpPr/>
+          <p:nvPr/>
+        </p:nvSpPr>
+        <p:spPr>
+          <a:xfrm>
+            <a:off x="7244526" y="2431437"/>
+            <a:ext cx="158750" cy="166169"/>
+          </a:xfrm>
+          <a:prstGeom prst="ellipse">
+            <a:avLst/>
+          </a:prstGeom>
+          <a:solidFill>
+            <a:srgbClr val="0070C0"/>
+          </a:solidFill>
+          <a:ln>
+            <a:noFill/>
+          </a:ln>
+        </p:spPr>
+        <p:style>
+          <a:lnRef idx="0">
+            <a:scrgbClr r="0" g="0" b="0"/>
+          </a:lnRef>
+          <a:fillRef idx="0">
+            <a:scrgbClr r="0" g="0" b="0"/>
+          </a:fillRef>
+          <a:effectRef idx="0">
+            <a:scrgbClr r="0" g="0" b="0"/>
+          </a:effectRef>
+          <a:fontRef idx="minor">
+            <a:schemeClr val="dk1"/>
+          </a:fontRef>
+        </p:style>
+        <p:txBody>
+          <a:bodyPr rtlCol="0" anchor="ctr"/>
+          <a:lstStyle/>
+          <a:p>
+            <a:pPr algn="ctr"/>
+            <a:endParaRPr lang="en-US"/>
           </a:p>
         </p:txBody>
       </p:sp>
     </p:spTree>
     <p:extLst>
       <p:ext uri="{BB962C8B-B14F-4D97-AF65-F5344CB8AC3E}">
-        <p14:creationId xmlns:p14="http://schemas.microsoft.com/office/powerpoint/2010/main" val="878191479"/>
+        <p14:creationId xmlns:p14="http://schemas.microsoft.com/office/powerpoint/2010/main" val="3309706921"/>
       </p:ext>
     </p:extLst>
   </p:cSld>
@@ -28571,7 +29372,7 @@
           <p:cNvPr id="2" name="Title 1">
             <a:extLst>
               <a:ext uri="{FF2B5EF4-FFF2-40B4-BE49-F238E27FC236}">
-                <a16:creationId xmlns:a16="http://schemas.microsoft.com/office/drawing/2014/main" id="{4E7D5304-6FF9-4989-BFC8-084F4C4C934C}"/>
+                <a16:creationId xmlns:a16="http://schemas.microsoft.com/office/drawing/2014/main" id="{41A4FF66-FEBC-462D-B4E4-BFB2746A07C7}"/>
               </a:ext>
             </a:extLst>
           </p:cNvPr>
@@ -28582,7 +29383,12 @@
             <p:ph type="title"/>
           </p:nvPr>
         </p:nvSpPr>
-        <p:spPr/>
+        <p:spPr>
+          <a:xfrm>
+            <a:off x="677334" y="311430"/>
+            <a:ext cx="8596668" cy="1320800"/>
+          </a:xfrm>
+        </p:spPr>
         <p:txBody>
           <a:bodyPr/>
           <a:lstStyle/>
@@ -28594,7 +29400,7 @@
                 </a:solidFill>
                 <a:effectLst/>
               </a:rPr>
-              <a:t>lower bound analysis of the problem and the approximation</a:t>
+              <a:t>Big O of our Approximation</a:t>
             </a:r>
             <a:endParaRPr lang="en-US" dirty="0"/>
           </a:p>
@@ -28605,7 +29411,7 @@
           <p:cNvPr id="3" name="Content Placeholder 2">
             <a:extLst>
               <a:ext uri="{FF2B5EF4-FFF2-40B4-BE49-F238E27FC236}">
-                <a16:creationId xmlns:a16="http://schemas.microsoft.com/office/drawing/2014/main" id="{BB5AD3BB-0568-406E-B20D-436050F06ACF}"/>
+                <a16:creationId xmlns:a16="http://schemas.microsoft.com/office/drawing/2014/main" id="{96230890-F9D9-4140-9C26-8B6729B9309E}"/>
               </a:ext>
             </a:extLst>
           </p:cNvPr>
@@ -28616,94 +29422,585 @@
             <p:ph idx="1"/>
           </p:nvPr>
         </p:nvSpPr>
-        <p:spPr/>
+        <p:spPr>
+          <a:xfrm>
+            <a:off x="677334" y="2160589"/>
+            <a:ext cx="3924483" cy="3880773"/>
+          </a:xfrm>
+        </p:spPr>
         <p:txBody>
-          <a:bodyPr/>
+          <a:bodyPr>
+            <a:normAutofit/>
+          </a:bodyPr>
           <a:lstStyle/>
           <a:p>
             <a:r>
-              <a:rPr lang="en-US" dirty="0"/>
-              <a:t>Use maximum click approximation for lower bound</a:t>
-            </a:r>
-          </a:p>
-          <a:p>
-            <a:r>
-              <a:rPr lang="en-US" dirty="0"/>
-              <a:t>Return from maximum click approximation is no more than half of the actual correct answer for min graph color. </a:t>
-            </a:r>
-          </a:p>
-          <a:p>
-            <a:r>
-              <a:rPr lang="en-US" dirty="0"/>
-              <a:t>Compare approximation return to return from max click approximation to figure out how accurate approximation solution is </a:t>
-            </a:r>
-          </a:p>
-          <a:p>
-            <a:endParaRPr lang="en-US" dirty="0"/>
-          </a:p>
-          <a:p>
-            <a:r>
-              <a:rPr lang="pt-BR" dirty="0"/>
-              <a:t>O(</a:t>
-            </a:r>
-            <a:r>
-              <a:rPr lang="pt-BR" i="1" dirty="0"/>
-              <a:t>n</a:t>
-            </a:r>
-            <a:r>
-              <a:rPr lang="pt-BR" dirty="0"/>
-              <a:t>(log </a:t>
-            </a:r>
-            <a:r>
-              <a:rPr lang="pt-BR" dirty="0" err="1"/>
-              <a:t>log</a:t>
-            </a:r>
-            <a:r>
-              <a:rPr lang="pt-BR" dirty="0"/>
-              <a:t> </a:t>
-            </a:r>
-            <a:r>
-              <a:rPr lang="pt-BR" i="1" dirty="0"/>
-              <a:t>n</a:t>
-            </a:r>
-            <a:r>
-              <a:rPr lang="pt-BR" dirty="0"/>
-              <a:t>)</a:t>
-            </a:r>
-            <a:r>
-              <a:rPr lang="pt-BR" baseline="30000" dirty="0"/>
-              <a:t>2</a:t>
-            </a:r>
-            <a:r>
-              <a:rPr lang="pt-BR" dirty="0"/>
-              <a:t>/log</a:t>
-            </a:r>
-            <a:r>
-              <a:rPr lang="pt-BR" baseline="30000" dirty="0"/>
-              <a:t>3</a:t>
-            </a:r>
-            <a:r>
-              <a:rPr lang="pt-BR" i="1" dirty="0"/>
-              <a:t>n</a:t>
-            </a:r>
-            <a:r>
-              <a:rPr lang="pt-BR" dirty="0"/>
-              <a:t>)</a:t>
-            </a:r>
-            <a:r>
-              <a:rPr lang="en-US" dirty="0"/>
-              <a:t> – max clique approximation???</a:t>
-            </a:r>
-          </a:p>
-          <a:p>
-            <a:endParaRPr lang="en-US" dirty="0"/>
+              <a:rPr lang="en-US" sz="3200" dirty="0"/>
+              <a:t>O(V^2 * E)</a:t>
+            </a:r>
           </a:p>
         </p:txBody>
       </p:sp>
+      <p:sp>
+        <p:nvSpPr>
+          <p:cNvPr id="5" name="TextBox 4">
+            <a:extLst>
+              <a:ext uri="{FF2B5EF4-FFF2-40B4-BE49-F238E27FC236}">
+                <a16:creationId xmlns:a16="http://schemas.microsoft.com/office/drawing/2014/main" id="{CEB4BC64-79AA-4D8D-BFF9-3D31DBD7E0B8}"/>
+              </a:ext>
+            </a:extLst>
+          </p:cNvPr>
+          <p:cNvSpPr txBox="1"/>
+          <p:nvPr/>
+        </p:nvSpPr>
+        <p:spPr>
+          <a:xfrm>
+            <a:off x="3311570" y="1092076"/>
+            <a:ext cx="6102626" cy="5587107"/>
+          </a:xfrm>
+          <a:prstGeom prst="rect">
+            <a:avLst/>
+          </a:prstGeom>
+          <a:noFill/>
+        </p:spPr>
+        <p:txBody>
+          <a:bodyPr wrap="square">
+            <a:spAutoFit/>
+          </a:bodyPr>
+          <a:lstStyle/>
+          <a:p>
+            <a:pPr>
+              <a:lnSpc>
+                <a:spcPct val="150000"/>
+              </a:lnSpc>
+            </a:pPr>
+            <a:r>
+              <a:rPr lang="en-US" sz="1600" dirty="0" err="1"/>
+              <a:t>Approx_min_colors</a:t>
+            </a:r>
+            <a:r>
+              <a:rPr lang="en-US" sz="1600" dirty="0"/>
+              <a:t>(G, V):</a:t>
+            </a:r>
+          </a:p>
+          <a:p>
+            <a:pPr marL="0" indent="0">
+              <a:lnSpc>
+                <a:spcPct val="150000"/>
+              </a:lnSpc>
+              <a:buNone/>
+            </a:pPr>
+            <a:r>
+              <a:rPr lang="en-US" sz="1600" dirty="0"/>
+              <a:t>	result[-1 * V]</a:t>
+            </a:r>
+          </a:p>
+          <a:p>
+            <a:pPr marL="0" indent="0">
+              <a:lnSpc>
+                <a:spcPct val="150000"/>
+              </a:lnSpc>
+              <a:buNone/>
+            </a:pPr>
+            <a:r>
+              <a:rPr lang="en-US" sz="1600" dirty="0"/>
+              <a:t>	</a:t>
+            </a:r>
+            <a:r>
+              <a:rPr lang="en-US" sz="1600" dirty="0" err="1"/>
+              <a:t>available_colors</a:t>
+            </a:r>
+            <a:r>
+              <a:rPr lang="en-US" sz="1600" dirty="0"/>
+              <a:t>[false * V]</a:t>
+            </a:r>
+          </a:p>
+          <a:p>
+            <a:pPr marL="0" indent="0">
+              <a:lnSpc>
+                <a:spcPct val="150000"/>
+              </a:lnSpc>
+              <a:buNone/>
+            </a:pPr>
+            <a:r>
+              <a:rPr lang="en-US" sz="1600" dirty="0"/>
+              <a:t>	result[0] = 0</a:t>
+            </a:r>
+          </a:p>
+          <a:p>
+            <a:pPr marL="0" indent="0">
+              <a:lnSpc>
+                <a:spcPct val="150000"/>
+              </a:lnSpc>
+              <a:buNone/>
+            </a:pPr>
+            <a:r>
+              <a:rPr lang="en-US" sz="1600" dirty="0"/>
+              <a:t>	for each node u:</a:t>
+            </a:r>
+          </a:p>
+          <a:p>
+            <a:pPr marL="0" indent="0">
+              <a:lnSpc>
+                <a:spcPct val="150000"/>
+              </a:lnSpc>
+              <a:buNone/>
+            </a:pPr>
+            <a:r>
+              <a:rPr lang="en-US" sz="1600" dirty="0"/>
+              <a:t>		for each node v adjacent to u:</a:t>
+            </a:r>
+          </a:p>
+          <a:p>
+            <a:pPr marL="0" indent="0">
+              <a:lnSpc>
+                <a:spcPct val="150000"/>
+              </a:lnSpc>
+              <a:buNone/>
+            </a:pPr>
+            <a:r>
+              <a:rPr lang="en-US" sz="1600" dirty="0"/>
+              <a:t>			set coloring of v to unavailable</a:t>
+            </a:r>
+          </a:p>
+          <a:p>
+            <a:pPr marL="0" indent="0">
+              <a:lnSpc>
+                <a:spcPct val="150000"/>
+              </a:lnSpc>
+              <a:buNone/>
+            </a:pPr>
+            <a:r>
+              <a:rPr lang="en-US" sz="1600" dirty="0"/>
+              <a:t>		color = 0</a:t>
+            </a:r>
+          </a:p>
+          <a:p>
+            <a:pPr marL="0" indent="0">
+              <a:lnSpc>
+                <a:spcPct val="150000"/>
+              </a:lnSpc>
+              <a:buNone/>
+            </a:pPr>
+            <a:r>
+              <a:rPr lang="en-US" sz="1600" dirty="0"/>
+              <a:t>		while color &lt; V:</a:t>
+            </a:r>
+          </a:p>
+          <a:p>
+            <a:pPr marL="0" indent="0">
+              <a:lnSpc>
+                <a:spcPct val="150000"/>
+              </a:lnSpc>
+              <a:buNone/>
+            </a:pPr>
+            <a:r>
+              <a:rPr lang="en-US" sz="1600" dirty="0"/>
+              <a:t>			if color is available:</a:t>
+            </a:r>
+          </a:p>
+          <a:p>
+            <a:pPr marL="0" indent="0">
+              <a:lnSpc>
+                <a:spcPct val="150000"/>
+              </a:lnSpc>
+              <a:buNone/>
+            </a:pPr>
+            <a:r>
+              <a:rPr lang="en-US" sz="1600" dirty="0"/>
+              <a:t>				break</a:t>
+            </a:r>
+          </a:p>
+          <a:p>
+            <a:pPr marL="0" indent="0">
+              <a:lnSpc>
+                <a:spcPct val="150000"/>
+              </a:lnSpc>
+              <a:buNone/>
+            </a:pPr>
+            <a:r>
+              <a:rPr lang="en-US" sz="1600" dirty="0"/>
+              <a:t>			color += 1</a:t>
+            </a:r>
+          </a:p>
+          <a:p>
+            <a:pPr marL="0" indent="0">
+              <a:lnSpc>
+                <a:spcPct val="150000"/>
+              </a:lnSpc>
+              <a:buNone/>
+            </a:pPr>
+            <a:r>
+              <a:rPr lang="en-US" sz="1600" dirty="0"/>
+              <a:t>		result[u] = color</a:t>
+            </a:r>
+          </a:p>
+          <a:p>
+            <a:pPr marL="0" indent="0">
+              <a:lnSpc>
+                <a:spcPct val="150000"/>
+              </a:lnSpc>
+              <a:buNone/>
+            </a:pPr>
+            <a:r>
+              <a:rPr lang="en-US" sz="1600" dirty="0"/>
+              <a:t>		for C in </a:t>
+            </a:r>
+            <a:r>
+              <a:rPr lang="en-US" sz="1600" dirty="0" err="1"/>
+              <a:t>available_colors</a:t>
+            </a:r>
+            <a:r>
+              <a:rPr lang="en-US" sz="1600" dirty="0"/>
+              <a:t>:</a:t>
+            </a:r>
+          </a:p>
+          <a:p>
+            <a:pPr marL="0" indent="0">
+              <a:lnSpc>
+                <a:spcPct val="150000"/>
+              </a:lnSpc>
+              <a:buNone/>
+            </a:pPr>
+            <a:r>
+              <a:rPr lang="en-US" sz="1600" dirty="0"/>
+              <a:t>			set C as Available</a:t>
+            </a:r>
+          </a:p>
+        </p:txBody>
+      </p:sp>
+      <p:cxnSp>
+        <p:nvCxnSpPr>
+          <p:cNvPr id="8" name="Straight Arrow Connector 7">
+            <a:extLst>
+              <a:ext uri="{FF2B5EF4-FFF2-40B4-BE49-F238E27FC236}">
+                <a16:creationId xmlns:a16="http://schemas.microsoft.com/office/drawing/2014/main" id="{4AD618AB-4DB2-40DC-887A-0FCB6C927B3B}"/>
+              </a:ext>
+            </a:extLst>
+          </p:cNvPr>
+          <p:cNvCxnSpPr>
+            <a:cxnSpLocks/>
+          </p:cNvCxnSpPr>
+          <p:nvPr/>
+        </p:nvCxnSpPr>
+        <p:spPr>
+          <a:xfrm flipH="1">
+            <a:off x="5478853" y="2414578"/>
+            <a:ext cx="1529153" cy="337930"/>
+          </a:xfrm>
+          <a:prstGeom prst="straightConnector1">
+            <a:avLst/>
+          </a:prstGeom>
+          <a:ln>
+            <a:tailEnd type="triangle"/>
+          </a:ln>
+        </p:spPr>
+        <p:style>
+          <a:lnRef idx="3">
+            <a:schemeClr val="accent1"/>
+          </a:lnRef>
+          <a:fillRef idx="0">
+            <a:schemeClr val="accent1"/>
+          </a:fillRef>
+          <a:effectRef idx="2">
+            <a:schemeClr val="accent1"/>
+          </a:effectRef>
+          <a:fontRef idx="minor">
+            <a:schemeClr val="tx1"/>
+          </a:fontRef>
+        </p:style>
+      </p:cxnSp>
+      <p:sp>
+        <p:nvSpPr>
+          <p:cNvPr id="9" name="TextBox 8">
+            <a:extLst>
+              <a:ext uri="{FF2B5EF4-FFF2-40B4-BE49-F238E27FC236}">
+                <a16:creationId xmlns:a16="http://schemas.microsoft.com/office/drawing/2014/main" id="{1821F7F4-4D0E-4291-9204-F6E4EBAAE62E}"/>
+              </a:ext>
+            </a:extLst>
+          </p:cNvPr>
+          <p:cNvSpPr txBox="1"/>
+          <p:nvPr/>
+        </p:nvSpPr>
+        <p:spPr>
+          <a:xfrm>
+            <a:off x="7008006" y="2070234"/>
+            <a:ext cx="4200940" cy="400110"/>
+          </a:xfrm>
+          <a:prstGeom prst="rect">
+            <a:avLst/>
+          </a:prstGeom>
+          <a:noFill/>
+        </p:spPr>
+        <p:txBody>
+          <a:bodyPr wrap="square" rtlCol="0">
+            <a:spAutoFit/>
+          </a:bodyPr>
+          <a:lstStyle/>
+          <a:p>
+            <a:r>
+              <a:rPr lang="en-US" sz="2000" dirty="0">
+                <a:solidFill>
+                  <a:schemeClr val="accent1">
+                    <a:lumMod val="75000"/>
+                  </a:schemeClr>
+                </a:solidFill>
+              </a:rPr>
+              <a:t>Loop Through V Times</a:t>
+            </a:r>
+          </a:p>
+        </p:txBody>
+      </p:sp>
+      <p:cxnSp>
+        <p:nvCxnSpPr>
+          <p:cNvPr id="11" name="Straight Arrow Connector 10">
+            <a:extLst>
+              <a:ext uri="{FF2B5EF4-FFF2-40B4-BE49-F238E27FC236}">
+                <a16:creationId xmlns:a16="http://schemas.microsoft.com/office/drawing/2014/main" id="{DA41FD64-F4C4-4E99-BE71-CDEB1714627B}"/>
+              </a:ext>
+            </a:extLst>
+          </p:cNvPr>
+          <p:cNvCxnSpPr>
+            <a:cxnSpLocks/>
+          </p:cNvCxnSpPr>
+          <p:nvPr/>
+        </p:nvCxnSpPr>
+        <p:spPr>
+          <a:xfrm flipH="1">
+            <a:off x="7132985" y="3038815"/>
+            <a:ext cx="728867" cy="89452"/>
+          </a:xfrm>
+          <a:prstGeom prst="straightConnector1">
+            <a:avLst/>
+          </a:prstGeom>
+          <a:ln>
+            <a:tailEnd type="triangle"/>
+          </a:ln>
+        </p:spPr>
+        <p:style>
+          <a:lnRef idx="3">
+            <a:schemeClr val="accent1"/>
+          </a:lnRef>
+          <a:fillRef idx="0">
+            <a:schemeClr val="accent1"/>
+          </a:fillRef>
+          <a:effectRef idx="2">
+            <a:schemeClr val="accent1"/>
+          </a:effectRef>
+          <a:fontRef idx="minor">
+            <a:schemeClr val="tx1"/>
+          </a:fontRef>
+        </p:style>
+      </p:cxnSp>
+      <p:sp>
+        <p:nvSpPr>
+          <p:cNvPr id="14" name="TextBox 13">
+            <a:extLst>
+              <a:ext uri="{FF2B5EF4-FFF2-40B4-BE49-F238E27FC236}">
+                <a16:creationId xmlns:a16="http://schemas.microsoft.com/office/drawing/2014/main" id="{B6EDE233-B415-4793-8882-78D46C462723}"/>
+              </a:ext>
+            </a:extLst>
+          </p:cNvPr>
+          <p:cNvSpPr txBox="1"/>
+          <p:nvPr/>
+        </p:nvSpPr>
+        <p:spPr>
+          <a:xfrm>
+            <a:off x="7974586" y="2583543"/>
+            <a:ext cx="1779105" cy="707886"/>
+          </a:xfrm>
+          <a:prstGeom prst="rect">
+            <a:avLst/>
+          </a:prstGeom>
+          <a:noFill/>
+        </p:spPr>
+        <p:txBody>
+          <a:bodyPr wrap="square" rtlCol="0">
+            <a:spAutoFit/>
+          </a:bodyPr>
+          <a:lstStyle/>
+          <a:p>
+            <a:r>
+              <a:rPr lang="en-US" sz="2000" dirty="0">
+                <a:solidFill>
+                  <a:schemeClr val="accent1">
+                    <a:lumMod val="75000"/>
+                  </a:schemeClr>
+                </a:solidFill>
+              </a:rPr>
+              <a:t>Loop Through E Times</a:t>
+            </a:r>
+          </a:p>
+        </p:txBody>
+      </p:sp>
+      <p:sp>
+        <p:nvSpPr>
+          <p:cNvPr id="15" name="TextBox 14">
+            <a:extLst>
+              <a:ext uri="{FF2B5EF4-FFF2-40B4-BE49-F238E27FC236}">
+                <a16:creationId xmlns:a16="http://schemas.microsoft.com/office/drawing/2014/main" id="{2D3371F9-9AF4-4E95-934D-96DF77BD263C}"/>
+              </a:ext>
+            </a:extLst>
+          </p:cNvPr>
+          <p:cNvSpPr txBox="1"/>
+          <p:nvPr/>
+        </p:nvSpPr>
+        <p:spPr>
+          <a:xfrm>
+            <a:off x="7807189" y="3908913"/>
+            <a:ext cx="1779105" cy="707886"/>
+          </a:xfrm>
+          <a:prstGeom prst="rect">
+            <a:avLst/>
+          </a:prstGeom>
+          <a:noFill/>
+        </p:spPr>
+        <p:txBody>
+          <a:bodyPr wrap="square" rtlCol="0">
+            <a:spAutoFit/>
+          </a:bodyPr>
+          <a:lstStyle/>
+          <a:p>
+            <a:r>
+              <a:rPr lang="en-US" sz="2000" dirty="0">
+                <a:solidFill>
+                  <a:schemeClr val="accent1">
+                    <a:lumMod val="75000"/>
+                  </a:schemeClr>
+                </a:solidFill>
+              </a:rPr>
+              <a:t>Loop Through V Times</a:t>
+            </a:r>
+          </a:p>
+        </p:txBody>
+      </p:sp>
+      <p:sp>
+        <p:nvSpPr>
+          <p:cNvPr id="16" name="TextBox 15">
+            <a:extLst>
+              <a:ext uri="{FF2B5EF4-FFF2-40B4-BE49-F238E27FC236}">
+                <a16:creationId xmlns:a16="http://schemas.microsoft.com/office/drawing/2014/main" id="{913619C0-F889-4213-9DE9-36593CDFD193}"/>
+              </a:ext>
+            </a:extLst>
+          </p:cNvPr>
+          <p:cNvSpPr txBox="1"/>
+          <p:nvPr/>
+        </p:nvSpPr>
+        <p:spPr>
+          <a:xfrm>
+            <a:off x="7329371" y="5279885"/>
+            <a:ext cx="1779105" cy="707886"/>
+          </a:xfrm>
+          <a:prstGeom prst="rect">
+            <a:avLst/>
+          </a:prstGeom>
+          <a:noFill/>
+        </p:spPr>
+        <p:txBody>
+          <a:bodyPr wrap="square" rtlCol="0">
+            <a:spAutoFit/>
+          </a:bodyPr>
+          <a:lstStyle/>
+          <a:p>
+            <a:r>
+              <a:rPr lang="en-US" sz="2000" dirty="0">
+                <a:solidFill>
+                  <a:schemeClr val="accent1">
+                    <a:lumMod val="75000"/>
+                  </a:schemeClr>
+                </a:solidFill>
+              </a:rPr>
+              <a:t>Loop Through V Times</a:t>
+            </a:r>
+          </a:p>
+        </p:txBody>
+      </p:sp>
+      <p:cxnSp>
+        <p:nvCxnSpPr>
+          <p:cNvPr id="17" name="Straight Arrow Connector 16">
+            <a:extLst>
+              <a:ext uri="{FF2B5EF4-FFF2-40B4-BE49-F238E27FC236}">
+                <a16:creationId xmlns:a16="http://schemas.microsoft.com/office/drawing/2014/main" id="{0206383E-D3C4-4E16-B079-9877F8C51D5E}"/>
+              </a:ext>
+            </a:extLst>
+          </p:cNvPr>
+          <p:cNvCxnSpPr>
+            <a:cxnSpLocks/>
+          </p:cNvCxnSpPr>
+          <p:nvPr/>
+        </p:nvCxnSpPr>
+        <p:spPr>
+          <a:xfrm flipH="1">
+            <a:off x="5880652" y="4229057"/>
+            <a:ext cx="1875183" cy="0"/>
+          </a:xfrm>
+          <a:prstGeom prst="straightConnector1">
+            <a:avLst/>
+          </a:prstGeom>
+          <a:ln>
+            <a:tailEnd type="triangle"/>
+          </a:ln>
+        </p:spPr>
+        <p:style>
+          <a:lnRef idx="3">
+            <a:schemeClr val="accent1"/>
+          </a:lnRef>
+          <a:fillRef idx="0">
+            <a:schemeClr val="accent1"/>
+          </a:fillRef>
+          <a:effectRef idx="2">
+            <a:schemeClr val="accent1"/>
+          </a:effectRef>
+          <a:fontRef idx="minor">
+            <a:schemeClr val="tx1"/>
+          </a:fontRef>
+        </p:style>
+      </p:cxnSp>
+      <p:cxnSp>
+        <p:nvCxnSpPr>
+          <p:cNvPr id="19" name="Straight Arrow Connector 18">
+            <a:extLst>
+              <a:ext uri="{FF2B5EF4-FFF2-40B4-BE49-F238E27FC236}">
+                <a16:creationId xmlns:a16="http://schemas.microsoft.com/office/drawing/2014/main" id="{41B1A75C-673C-4EF9-808C-B0A43F284114}"/>
+              </a:ext>
+            </a:extLst>
+          </p:cNvPr>
+          <p:cNvCxnSpPr>
+            <a:cxnSpLocks/>
+          </p:cNvCxnSpPr>
+          <p:nvPr/>
+        </p:nvCxnSpPr>
+        <p:spPr>
+          <a:xfrm flipH="1">
+            <a:off x="6662894" y="5772574"/>
+            <a:ext cx="573159" cy="196473"/>
+          </a:xfrm>
+          <a:prstGeom prst="straightConnector1">
+            <a:avLst/>
+          </a:prstGeom>
+          <a:ln>
+            <a:tailEnd type="triangle"/>
+          </a:ln>
+        </p:spPr>
+        <p:style>
+          <a:lnRef idx="3">
+            <a:schemeClr val="accent1"/>
+          </a:lnRef>
+          <a:fillRef idx="0">
+            <a:schemeClr val="accent1"/>
+          </a:fillRef>
+          <a:effectRef idx="2">
+            <a:schemeClr val="accent1"/>
+          </a:effectRef>
+          <a:fontRef idx="minor">
+            <a:schemeClr val="tx1"/>
+          </a:fontRef>
+        </p:style>
+      </p:cxnSp>
     </p:spTree>
     <p:extLst>
       <p:ext uri="{BB962C8B-B14F-4D97-AF65-F5344CB8AC3E}">
-        <p14:creationId xmlns:p14="http://schemas.microsoft.com/office/powerpoint/2010/main" val="3079568740"/>
+        <p14:creationId xmlns:p14="http://schemas.microsoft.com/office/powerpoint/2010/main" val="878191479"/>
       </p:ext>
     </p:extLst>
   </p:cSld>
@@ -28716,6 +30013,14 @@
 <file path=ppt/slides/slide27.xml><?xml version="1.0" encoding="utf-8"?>
 <p:sld xmlns:a="http://schemas.openxmlformats.org/drawingml/2006/main" xmlns:r="http://schemas.openxmlformats.org/officeDocument/2006/relationships" xmlns:p="http://schemas.openxmlformats.org/presentationml/2006/main">
   <p:cSld>
+    <p:bg>
+      <p:bgPr>
+        <a:solidFill>
+          <a:schemeClr val="bg1"/>
+        </a:solidFill>
+        <a:effectLst/>
+      </p:bgPr>
+    </p:bg>
     <p:spTree>
       <p:nvGrpSpPr>
         <p:cNvPr id="1" name=""/>
@@ -28746,23 +30051,25 @@
             <p:ph type="title"/>
           </p:nvPr>
         </p:nvSpPr>
-        <p:spPr/>
+        <p:spPr>
+          <a:xfrm>
+            <a:off x="677334" y="609600"/>
+            <a:ext cx="8596668" cy="1320800"/>
+          </a:xfrm>
+        </p:spPr>
         <p:txBody>
-          <a:bodyPr>
-            <a:normAutofit fontScale="90000"/>
+          <a:bodyPr anchor="t">
+            <a:normAutofit/>
           </a:bodyPr>
           <a:lstStyle/>
           <a:p>
             <a:r>
-              <a:rPr lang="en-US" dirty="0">
-                <a:solidFill>
-                  <a:srgbClr val="000000"/>
-                </a:solidFill>
+              <a:rPr lang="en-US">
                 <a:effectLst/>
               </a:rPr>
-              <a:t>plots that illustrate the run-time (wall clock) performance of your exact solution versus the approximation solution on your test cases</a:t>
-            </a:r>
-            <a:endParaRPr lang="en-US" dirty="0"/>
+              <a:t>Runtime Comparison</a:t>
+            </a:r>
+            <a:endParaRPr lang="en-US"/>
           </a:p>
         </p:txBody>
       </p:sp>
@@ -28782,15 +30089,94 @@
             <p:ph idx="1"/>
           </p:nvPr>
         </p:nvSpPr>
-        <p:spPr/>
+        <p:spPr>
+          <a:xfrm>
+            <a:off x="6336287" y="2160589"/>
+            <a:ext cx="2934714" cy="3880773"/>
+          </a:xfrm>
+        </p:spPr>
         <p:txBody>
-          <a:bodyPr/>
+          <a:bodyPr>
+            <a:normAutofit/>
+          </a:bodyPr>
           <a:lstStyle/>
           <a:p>
-            <a:endParaRPr lang="en-US"/>
+            <a:pPr>
+              <a:lnSpc>
+                <a:spcPct val="150000"/>
+              </a:lnSpc>
+            </a:pPr>
+            <a:r>
+              <a:rPr lang="en-US" sz="2000" dirty="0"/>
+              <a:t>Runtime average for   20 V, 20 E: 425s</a:t>
+            </a:r>
+          </a:p>
+          <a:p>
+            <a:pPr>
+              <a:lnSpc>
+                <a:spcPct val="150000"/>
+              </a:lnSpc>
+            </a:pPr>
+            <a:r>
+              <a:rPr lang="en-US" sz="2000" dirty="0"/>
+              <a:t>Runtime average for   20 V, 30 E: 5992s  (~100 minutes)</a:t>
+            </a:r>
+          </a:p>
+          <a:p>
+            <a:pPr>
+              <a:lnSpc>
+                <a:spcPct val="150000"/>
+              </a:lnSpc>
+            </a:pPr>
+            <a:endParaRPr lang="en-US" sz="2000" dirty="0"/>
           </a:p>
         </p:txBody>
       </p:sp>
+      <p:pic>
+        <p:nvPicPr>
+          <p:cNvPr id="1028" name="Picture 4">
+            <a:extLst>
+              <a:ext uri="{FF2B5EF4-FFF2-40B4-BE49-F238E27FC236}">
+                <a16:creationId xmlns:a16="http://schemas.microsoft.com/office/drawing/2014/main" id="{B1D34CD8-031B-447B-AF65-897732359F4D}"/>
+              </a:ext>
+            </a:extLst>
+          </p:cNvPr>
+          <p:cNvPicPr>
+            <a:picLocks noChangeAspect="1" noChangeArrowheads="1"/>
+          </p:cNvPicPr>
+          <p:nvPr/>
+        </p:nvPicPr>
+        <p:blipFill rotWithShape="1">
+          <a:blip r:embed="rId2">
+            <a:extLst>
+              <a:ext uri="{28A0092B-C50C-407E-A947-70E740481C1C}">
+                <a14:useLocalDpi xmlns:a14="http://schemas.microsoft.com/office/drawing/2010/main" val="0"/>
+              </a:ext>
+            </a:extLst>
+          </a:blip>
+          <a:srcRect l="13739"/>
+          <a:stretch/>
+        </p:blipFill>
+        <p:spPr bwMode="auto">
+          <a:xfrm>
+            <a:off x="677334" y="2159331"/>
+            <a:ext cx="5423429" cy="3882362"/>
+          </a:xfrm>
+          <a:prstGeom prst="rect">
+            <a:avLst/>
+          </a:prstGeom>
+          <a:noFill/>
+          <a:extLst>
+            <a:ext uri="{909E8E84-426E-40DD-AFC4-6F175D3DCCD1}">
+              <a14:hiddenFill xmlns:a14="http://schemas.microsoft.com/office/drawing/2010/main">
+                <a:solidFill>
+                  <a:srgbClr val="FFFFFF"/>
+                </a:solidFill>
+              </a14:hiddenFill>
+            </a:ext>
+          </a:extLst>
+        </p:spPr>
+      </p:pic>
     </p:spTree>
     <p:extLst>
       <p:ext uri="{BB962C8B-B14F-4D97-AF65-F5344CB8AC3E}">
@@ -28807,6 +30193,324 @@
 <file path=ppt/slides/slide28.xml><?xml version="1.0" encoding="utf-8"?>
 <p:sld xmlns:a="http://schemas.openxmlformats.org/drawingml/2006/main" xmlns:r="http://schemas.openxmlformats.org/officeDocument/2006/relationships" xmlns:p="http://schemas.openxmlformats.org/presentationml/2006/main">
   <p:cSld>
+    <p:bg>
+      <p:bgPr>
+        <a:solidFill>
+          <a:schemeClr val="bg1"/>
+        </a:solidFill>
+        <a:effectLst/>
+      </p:bgPr>
+    </p:bg>
+    <p:spTree>
+      <p:nvGrpSpPr>
+        <p:cNvPr id="1" name=""/>
+        <p:cNvGrpSpPr/>
+        <p:nvPr/>
+      </p:nvGrpSpPr>
+      <p:grpSpPr>
+        <a:xfrm>
+          <a:off x="0" y="0"/>
+          <a:ext cx="0" cy="0"/>
+          <a:chOff x="0" y="0"/>
+          <a:chExt cx="0" cy="0"/>
+        </a:xfrm>
+      </p:grpSpPr>
+      <p:sp>
+        <p:nvSpPr>
+          <p:cNvPr id="2" name="Title 1">
+            <a:extLst>
+              <a:ext uri="{FF2B5EF4-FFF2-40B4-BE49-F238E27FC236}">
+                <a16:creationId xmlns:a16="http://schemas.microsoft.com/office/drawing/2014/main" id="{4E7D5304-6FF9-4989-BFC8-084F4C4C934C}"/>
+              </a:ext>
+            </a:extLst>
+          </p:cNvPr>
+          <p:cNvSpPr>
+            <a:spLocks noGrp="1"/>
+          </p:cNvSpPr>
+          <p:nvPr>
+            <p:ph type="title"/>
+          </p:nvPr>
+        </p:nvSpPr>
+        <p:spPr>
+          <a:xfrm>
+            <a:off x="677334" y="609600"/>
+            <a:ext cx="8596668" cy="1320800"/>
+          </a:xfrm>
+        </p:spPr>
+        <p:txBody>
+          <a:bodyPr anchor="t">
+            <a:normAutofit/>
+          </a:bodyPr>
+          <a:lstStyle/>
+          <a:p>
+            <a:r>
+              <a:rPr lang="en-US" dirty="0"/>
+              <a:t>Lower Bound</a:t>
+            </a:r>
+          </a:p>
+        </p:txBody>
+      </p:sp>
+      <p:sp>
+        <p:nvSpPr>
+          <p:cNvPr id="3" name="Content Placeholder 2">
+            <a:extLst>
+              <a:ext uri="{FF2B5EF4-FFF2-40B4-BE49-F238E27FC236}">
+                <a16:creationId xmlns:a16="http://schemas.microsoft.com/office/drawing/2014/main" id="{BB5AD3BB-0568-406E-B20D-436050F06ACF}"/>
+              </a:ext>
+            </a:extLst>
+          </p:cNvPr>
+          <p:cNvSpPr>
+            <a:spLocks noGrp="1"/>
+          </p:cNvSpPr>
+          <p:nvPr>
+            <p:ph idx="1"/>
+          </p:nvPr>
+        </p:nvSpPr>
+        <p:spPr>
+          <a:xfrm>
+            <a:off x="677334" y="2160590"/>
+            <a:ext cx="5220430" cy="3701270"/>
+          </a:xfrm>
+        </p:spPr>
+        <p:txBody>
+          <a:bodyPr>
+            <a:normAutofit/>
+          </a:bodyPr>
+          <a:lstStyle/>
+          <a:p>
+            <a:pPr>
+              <a:lnSpc>
+                <a:spcPct val="150000"/>
+              </a:lnSpc>
+            </a:pPr>
+            <a:r>
+              <a:rPr lang="en-US" sz="2000" dirty="0"/>
+              <a:t>The Maximum Clique can serve as a lower bound</a:t>
+            </a:r>
+          </a:p>
+          <a:p>
+            <a:pPr>
+              <a:lnSpc>
+                <a:spcPct val="150000"/>
+              </a:lnSpc>
+            </a:pPr>
+            <a:r>
+              <a:rPr lang="en-US" sz="2000" dirty="0"/>
+              <a:t>Maximum Clique approximations could help us find how accurate our approximation is in polynomial time</a:t>
+            </a:r>
+          </a:p>
+        </p:txBody>
+      </p:sp>
+      <p:pic>
+        <p:nvPicPr>
+          <p:cNvPr id="5" name="Picture 4" descr="A close-up of a stethoscope&#10;&#10;Description automatically generated with medium confidence">
+            <a:extLst>
+              <a:ext uri="{FF2B5EF4-FFF2-40B4-BE49-F238E27FC236}">
+                <a16:creationId xmlns:a16="http://schemas.microsoft.com/office/drawing/2014/main" id="{F7F3996B-02A8-43EE-9184-B6BD90372AC0}"/>
+              </a:ext>
+            </a:extLst>
+          </p:cNvPr>
+          <p:cNvPicPr>
+            <a:picLocks noChangeAspect="1"/>
+          </p:cNvPicPr>
+          <p:nvPr/>
+        </p:nvPicPr>
+        <p:blipFill>
+          <a:blip r:embed="rId2">
+            <a:extLst>
+              <a:ext uri="{28A0092B-C50C-407E-A947-70E740481C1C}">
+                <a14:useLocalDpi xmlns:a14="http://schemas.microsoft.com/office/drawing/2010/main" val="0"/>
+              </a:ext>
+            </a:extLst>
+          </a:blip>
+          <a:stretch>
+            <a:fillRect/>
+          </a:stretch>
+        </p:blipFill>
+        <p:spPr>
+          <a:xfrm>
+            <a:off x="6096000" y="2160590"/>
+            <a:ext cx="3145536" cy="3145536"/>
+          </a:xfrm>
+          <a:prstGeom prst="rect">
+            <a:avLst/>
+          </a:prstGeom>
+        </p:spPr>
+      </p:pic>
+      <p:sp>
+        <p:nvSpPr>
+          <p:cNvPr id="6" name="Oval 5">
+            <a:extLst>
+              <a:ext uri="{FF2B5EF4-FFF2-40B4-BE49-F238E27FC236}">
+                <a16:creationId xmlns:a16="http://schemas.microsoft.com/office/drawing/2014/main" id="{70E44594-0563-4AA8-85CF-043AED700EF3}"/>
+              </a:ext>
+            </a:extLst>
+          </p:cNvPr>
+          <p:cNvSpPr/>
+          <p:nvPr/>
+        </p:nvSpPr>
+        <p:spPr>
+          <a:xfrm>
+            <a:off x="6337362" y="3463032"/>
+            <a:ext cx="158750" cy="166169"/>
+          </a:xfrm>
+          <a:prstGeom prst="ellipse">
+            <a:avLst/>
+          </a:prstGeom>
+          <a:solidFill>
+            <a:srgbClr val="FF0000"/>
+          </a:solidFill>
+          <a:ln>
+            <a:noFill/>
+          </a:ln>
+        </p:spPr>
+        <p:style>
+          <a:lnRef idx="0">
+            <a:scrgbClr r="0" g="0" b="0"/>
+          </a:lnRef>
+          <a:fillRef idx="0">
+            <a:scrgbClr r="0" g="0" b="0"/>
+          </a:fillRef>
+          <a:effectRef idx="0">
+            <a:scrgbClr r="0" g="0" b="0"/>
+          </a:effectRef>
+          <a:fontRef idx="minor">
+            <a:schemeClr val="dk1"/>
+          </a:fontRef>
+        </p:style>
+        <p:txBody>
+          <a:bodyPr rtlCol="0" anchor="ctr"/>
+          <a:lstStyle/>
+          <a:p>
+            <a:pPr algn="ctr"/>
+            <a:endParaRPr lang="en-US"/>
+          </a:p>
+        </p:txBody>
+      </p:sp>
+      <p:sp>
+        <p:nvSpPr>
+          <p:cNvPr id="7" name="Oval 6">
+            <a:extLst>
+              <a:ext uri="{FF2B5EF4-FFF2-40B4-BE49-F238E27FC236}">
+                <a16:creationId xmlns:a16="http://schemas.microsoft.com/office/drawing/2014/main" id="{A68BF90F-7369-47AF-8628-8D5E044E578A}"/>
+              </a:ext>
+            </a:extLst>
+          </p:cNvPr>
+          <p:cNvSpPr/>
+          <p:nvPr/>
+        </p:nvSpPr>
+        <p:spPr>
+          <a:xfrm>
+            <a:off x="7842965" y="4217149"/>
+            <a:ext cx="158750" cy="166169"/>
+          </a:xfrm>
+          <a:prstGeom prst="ellipse">
+            <a:avLst/>
+          </a:prstGeom>
+          <a:solidFill>
+            <a:srgbClr val="0070C0"/>
+          </a:solidFill>
+          <a:ln>
+            <a:noFill/>
+          </a:ln>
+        </p:spPr>
+        <p:style>
+          <a:lnRef idx="0">
+            <a:scrgbClr r="0" g="0" b="0"/>
+          </a:lnRef>
+          <a:fillRef idx="0">
+            <a:scrgbClr r="0" g="0" b="0"/>
+          </a:fillRef>
+          <a:effectRef idx="0">
+            <a:scrgbClr r="0" g="0" b="0"/>
+          </a:effectRef>
+          <a:fontRef idx="minor">
+            <a:schemeClr val="dk1"/>
+          </a:fontRef>
+        </p:style>
+        <p:txBody>
+          <a:bodyPr rtlCol="0" anchor="ctr"/>
+          <a:lstStyle/>
+          <a:p>
+            <a:pPr algn="ctr"/>
+            <a:endParaRPr lang="en-US"/>
+          </a:p>
+        </p:txBody>
+      </p:sp>
+      <p:sp>
+        <p:nvSpPr>
+          <p:cNvPr id="8" name="Oval 7">
+            <a:extLst>
+              <a:ext uri="{FF2B5EF4-FFF2-40B4-BE49-F238E27FC236}">
+                <a16:creationId xmlns:a16="http://schemas.microsoft.com/office/drawing/2014/main" id="{6AB1CFEC-DFE3-4111-8DB3-9637CA78B208}"/>
+              </a:ext>
+            </a:extLst>
+          </p:cNvPr>
+          <p:cNvSpPr/>
+          <p:nvPr/>
+        </p:nvSpPr>
+        <p:spPr>
+          <a:xfrm>
+            <a:off x="7412041" y="2822006"/>
+            <a:ext cx="158750" cy="166169"/>
+          </a:xfrm>
+          <a:prstGeom prst="ellipse">
+            <a:avLst/>
+          </a:prstGeom>
+          <a:solidFill>
+            <a:schemeClr val="accent2"/>
+          </a:solidFill>
+          <a:ln>
+            <a:noFill/>
+          </a:ln>
+        </p:spPr>
+        <p:style>
+          <a:lnRef idx="0">
+            <a:scrgbClr r="0" g="0" b="0"/>
+          </a:lnRef>
+          <a:fillRef idx="0">
+            <a:scrgbClr r="0" g="0" b="0"/>
+          </a:fillRef>
+          <a:effectRef idx="0">
+            <a:scrgbClr r="0" g="0" b="0"/>
+          </a:effectRef>
+          <a:fontRef idx="minor">
+            <a:schemeClr val="dk1"/>
+          </a:fontRef>
+        </p:style>
+        <p:txBody>
+          <a:bodyPr rtlCol="0" anchor="ctr"/>
+          <a:lstStyle/>
+          <a:p>
+            <a:pPr algn="ctr"/>
+            <a:endParaRPr lang="en-US"/>
+          </a:p>
+        </p:txBody>
+      </p:sp>
+    </p:spTree>
+    <p:extLst>
+      <p:ext uri="{BB962C8B-B14F-4D97-AF65-F5344CB8AC3E}">
+        <p14:creationId xmlns:p14="http://schemas.microsoft.com/office/powerpoint/2010/main" val="3079568740"/>
+      </p:ext>
+    </p:extLst>
+  </p:cSld>
+  <p:clrMapOvr>
+    <a:masterClrMapping/>
+  </p:clrMapOvr>
+</p:sld>
+</file>
+
+<file path=ppt/slides/slide29.xml><?xml version="1.0" encoding="utf-8"?>
+<p:sld xmlns:a="http://schemas.openxmlformats.org/drawingml/2006/main" xmlns:r="http://schemas.openxmlformats.org/officeDocument/2006/relationships" xmlns:p="http://schemas.openxmlformats.org/presentationml/2006/main">
+  <p:cSld>
+    <p:bg>
+      <p:bgPr>
+        <a:solidFill>
+          <a:schemeClr val="bg1"/>
+        </a:solidFill>
+        <a:effectLst/>
+      </p:bgPr>
+    </p:bg>
     <p:spTree>
       <p:nvGrpSpPr>
         <p:cNvPr id="1" name=""/>
@@ -28837,23 +30541,25 @@
             <p:ph type="title"/>
           </p:nvPr>
         </p:nvSpPr>
-        <p:spPr/>
+        <p:spPr>
+          <a:xfrm>
+            <a:off x="677334" y="609600"/>
+            <a:ext cx="8596668" cy="1320800"/>
+          </a:xfrm>
+        </p:spPr>
         <p:txBody>
-          <a:bodyPr>
-            <a:normAutofit fontScale="90000"/>
+          <a:bodyPr anchor="t">
+            <a:normAutofit/>
           </a:bodyPr>
           <a:lstStyle/>
           <a:p>
             <a:r>
-              <a:rPr lang="en-US" dirty="0">
-                <a:solidFill>
-                  <a:srgbClr val="000000"/>
-                </a:solidFill>
+              <a:rPr lang="en-US">
                 <a:effectLst/>
               </a:rPr>
-              <a:t>plots that compare the result/solution of your exact solution versus the approximation on your test cases.</a:t>
-            </a:r>
-            <a:endParaRPr lang="en-US" dirty="0"/>
+              <a:t>Result Comparison</a:t>
+            </a:r>
+            <a:endParaRPr lang="en-US"/>
           </a:p>
         </p:txBody>
       </p:sp>
@@ -28873,15 +30579,75 @@
             <p:ph idx="1"/>
           </p:nvPr>
         </p:nvSpPr>
-        <p:spPr/>
+        <p:spPr>
+          <a:xfrm>
+            <a:off x="6336287" y="2160589"/>
+            <a:ext cx="2934714" cy="3880773"/>
+          </a:xfrm>
+        </p:spPr>
         <p:txBody>
-          <a:bodyPr/>
+          <a:bodyPr>
+            <a:normAutofit/>
+          </a:bodyPr>
           <a:lstStyle/>
           <a:p>
-            <a:endParaRPr lang="en-US"/>
+            <a:pPr>
+              <a:lnSpc>
+                <a:spcPct val="150000"/>
+              </a:lnSpc>
+            </a:pPr>
+            <a:r>
+              <a:rPr lang="en-US" sz="2000" dirty="0"/>
+              <a:t>Output is almost always correct or off by one</a:t>
+            </a:r>
           </a:p>
         </p:txBody>
       </p:sp>
+      <p:pic>
+        <p:nvPicPr>
+          <p:cNvPr id="2052" name="Picture 4">
+            <a:extLst>
+              <a:ext uri="{FF2B5EF4-FFF2-40B4-BE49-F238E27FC236}">
+                <a16:creationId xmlns:a16="http://schemas.microsoft.com/office/drawing/2014/main" id="{3840D151-B7FC-4AE9-8A68-B2E50DD39EE8}"/>
+              </a:ext>
+            </a:extLst>
+          </p:cNvPr>
+          <p:cNvPicPr>
+            <a:picLocks noChangeAspect="1" noChangeArrowheads="1"/>
+          </p:cNvPicPr>
+          <p:nvPr/>
+        </p:nvPicPr>
+        <p:blipFill rotWithShape="1">
+          <a:blip r:embed="rId2">
+            <a:extLst>
+              <a:ext uri="{28A0092B-C50C-407E-A947-70E740481C1C}">
+                <a14:useLocalDpi xmlns:a14="http://schemas.microsoft.com/office/drawing/2010/main" val="0"/>
+              </a:ext>
+            </a:extLst>
+          </a:blip>
+          <a:srcRect l="6417" r="7322"/>
+          <a:stretch/>
+        </p:blipFill>
+        <p:spPr bwMode="auto">
+          <a:xfrm>
+            <a:off x="677334" y="2159331"/>
+            <a:ext cx="5423429" cy="3882362"/>
+          </a:xfrm>
+          <a:prstGeom prst="rect">
+            <a:avLst/>
+          </a:prstGeom>
+          <a:noFill/>
+          <a:extLst>
+            <a:ext uri="{909E8E84-426E-40DD-AFC4-6F175D3DCCD1}">
+              <a14:hiddenFill xmlns:a14="http://schemas.microsoft.com/office/drawing/2010/main">
+                <a:solidFill>
+                  <a:srgbClr val="FFFFFF"/>
+                </a:solidFill>
+              </a14:hiddenFill>
+            </a:ext>
+          </a:extLst>
+        </p:spPr>
+      </p:pic>
     </p:spTree>
     <p:extLst>
       <p:ext uri="{BB962C8B-B14F-4D97-AF65-F5344CB8AC3E}">
@@ -28892,6 +30658,98 @@
   <p:clrMapOvr>
     <a:masterClrMapping/>
   </p:clrMapOvr>
+  <p:timing>
+    <p:tnLst>
+      <p:par>
+        <p:cTn id="1" dur="indefinite" restart="never" nodeType="tmRoot">
+          <p:childTnLst>
+            <p:seq concurrent="1" nextAc="seek">
+              <p:cTn id="2" dur="indefinite" nodeType="mainSeq">
+                <p:childTnLst>
+                  <p:par>
+                    <p:cTn id="3" fill="hold">
+                      <p:stCondLst>
+                        <p:cond delay="indefinite"/>
+                        <p:cond evt="onBegin" delay="0">
+                          <p:tn val="2"/>
+                        </p:cond>
+                      </p:stCondLst>
+                      <p:childTnLst>
+                        <p:par>
+                          <p:cTn id="4" fill="hold">
+                            <p:stCondLst>
+                              <p:cond delay="0"/>
+                            </p:stCondLst>
+                            <p:childTnLst>
+                              <p:par>
+                                <p:cTn id="5" presetID="10" presetClass="entr" presetSubtype="0" fill="hold" grpId="0" nodeType="withEffect">
+                                  <p:stCondLst>
+                                    <p:cond delay="1000"/>
+                                  </p:stCondLst>
+                                  <p:iterate>
+                                    <p:tmPct val="10000"/>
+                                  </p:iterate>
+                                  <p:childTnLst>
+                                    <p:set>
+                                      <p:cBhvr>
+                                        <p:cTn id="6" dur="1" fill="hold">
+                                          <p:stCondLst>
+                                            <p:cond delay="0"/>
+                                          </p:stCondLst>
+                                        </p:cTn>
+                                        <p:tgtEl>
+                                          <p:spTgt spid="2"/>
+                                        </p:tgtEl>
+                                        <p:attrNameLst>
+                                          <p:attrName>style.visibility</p:attrName>
+                                        </p:attrNameLst>
+                                      </p:cBhvr>
+                                      <p:to>
+                                        <p:strVal val="visible"/>
+                                      </p:to>
+                                    </p:set>
+                                    <p:animEffect transition="in" filter="fade">
+                                      <p:cBhvr>
+                                        <p:cTn id="7" dur="700"/>
+                                        <p:tgtEl>
+                                          <p:spTgt spid="2"/>
+                                        </p:tgtEl>
+                                      </p:cBhvr>
+                                    </p:animEffect>
+                                  </p:childTnLst>
+                                </p:cTn>
+                              </p:par>
+                            </p:childTnLst>
+                          </p:cTn>
+                        </p:par>
+                      </p:childTnLst>
+                    </p:cTn>
+                  </p:par>
+                </p:childTnLst>
+              </p:cTn>
+              <p:prevCondLst>
+                <p:cond evt="onPrev" delay="0">
+                  <p:tgtEl>
+                    <p:sldTgt/>
+                  </p:tgtEl>
+                </p:cond>
+              </p:prevCondLst>
+              <p:nextCondLst>
+                <p:cond evt="onNext" delay="0">
+                  <p:tgtEl>
+                    <p:sldTgt/>
+                  </p:tgtEl>
+                </p:cond>
+              </p:nextCondLst>
+            </p:seq>
+          </p:childTnLst>
+        </p:cTn>
+      </p:par>
+    </p:tnLst>
+    <p:bldLst>
+      <p:bldP spid="2" grpId="0"/>
+    </p:bldLst>
+  </p:timing>
 </p:sld>
 </file>
 

</xml_diff>